<commit_message>
Changed the industry disaster story
</commit_message>
<xml_diff>
--- a/testing_part1.pptx
+++ b/testing_part1.pptx
@@ -24,7 +24,7 @@
     <p:sldId id="402" r:id="rId12"/>
     <p:sldId id="403" r:id="rId13"/>
     <p:sldId id="404" r:id="rId14"/>
-    <p:sldId id="506" r:id="rId15"/>
+    <p:sldId id="508" r:id="rId15"/>
     <p:sldId id="496" r:id="rId16"/>
     <p:sldId id="497" r:id="rId17"/>
     <p:sldId id="498" r:id="rId18"/>
@@ -191,7 +191,7 @@
             <p14:sldId id="402"/>
             <p14:sldId id="403"/>
             <p14:sldId id="404"/>
-            <p14:sldId id="506"/>
+            <p14:sldId id="508"/>
             <p14:sldId id="496"/>
             <p14:sldId id="497"/>
             <p14:sldId id="498"/>
@@ -7309,7 +7309,7 @@
             <a:fld id="{80AC11AF-147E-0A48-A5B0-8DA858D84551}" type="datetimeFigureOut">
               <a:rPr lang="en-US" smtClean="0"/>
               <a:pPr/>
-              <a:t>8/19/21</a:t>
+              <a:t>8/23/21</a:t>
             </a:fld>
             <a:endParaRPr lang="en-US"/>
           </a:p>
@@ -14735,10 +14735,10 @@
       </p:grpSpPr>
       <p:sp>
         <p:nvSpPr>
-          <p:cNvPr id="2" name="Title 1">
+          <p:cNvPr id="3" name="Date Placeholder 2">
             <a:extLst>
               <a:ext uri="{FF2B5EF4-FFF2-40B4-BE49-F238E27FC236}">
-                <a16:creationId xmlns:a16="http://schemas.microsoft.com/office/drawing/2014/main" id="{A127739B-DD60-8948-A6A1-FA79287926A8}"/>
+                <a16:creationId xmlns:a16="http://schemas.microsoft.com/office/drawing/2014/main" id="{2B807E07-EF76-814F-83B3-F724759CB454}"/>
               </a:ext>
             </a:extLst>
           </p:cNvPr>
@@ -14746,7 +14746,7 @@
             <a:spLocks noGrp="1"/>
           </p:cNvSpPr>
           <p:nvPr>
-            <p:ph type="title"/>
+            <p:ph type="dt" sz="half" idx="10"/>
           </p:nvPr>
         </p:nvSpPr>
         <p:spPr/>
@@ -14755,18 +14755,19 @@
           <a:lstStyle/>
           <a:p>
             <a:r>
-              <a:rPr lang="en-US" dirty="0"/>
-              <a:t>Meanwhile, in Hawaii…</a:t>
-            </a:r>
-          </a:p>
-        </p:txBody>
-      </p:sp>
-      <p:sp>
-        <p:nvSpPr>
-          <p:cNvPr id="3" name="Date Placeholder 2">
+              <a:rPr lang="de-CH" dirty="0"/>
+              <a:t>August 2021, CC BY-SA 4.0</a:t>
+            </a:r>
+            <a:endParaRPr lang="en-US" dirty="0"/>
+          </a:p>
+        </p:txBody>
+      </p:sp>
+      <p:sp>
+        <p:nvSpPr>
+          <p:cNvPr id="4" name="Footer Placeholder 3">
             <a:extLst>
               <a:ext uri="{FF2B5EF4-FFF2-40B4-BE49-F238E27FC236}">
-                <a16:creationId xmlns:a16="http://schemas.microsoft.com/office/drawing/2014/main" id="{C22EF6F6-0F54-9747-A923-D9B51906A8AE}"/>
+                <a16:creationId xmlns:a16="http://schemas.microsoft.com/office/drawing/2014/main" id="{EA95F4F3-78B5-E744-9239-00C1C12C929E}"/>
               </a:ext>
             </a:extLst>
           </p:cNvPr>
@@ -14774,7 +14775,7 @@
             <a:spLocks noGrp="1"/>
           </p:cNvSpPr>
           <p:nvPr>
-            <p:ph type="dt" sz="half" idx="10"/>
+            <p:ph type="ftr" sz="quarter" idx="11"/>
           </p:nvPr>
         </p:nvSpPr>
         <p:spPr/>
@@ -14783,47 +14784,18 @@
           <a:lstStyle/>
           <a:p>
             <a:r>
-              <a:rPr lang="de-CH"/>
-              <a:t>August 2021, CC BY-SA 4.0</a:t>
-            </a:r>
-            <a:endParaRPr lang="en-US" dirty="0"/>
-          </a:p>
-        </p:txBody>
-      </p:sp>
-      <p:sp>
-        <p:nvSpPr>
-          <p:cNvPr id="4" name="Footer Placeholder 3">
+              <a:rPr lang="en-US"/>
+              <a:t>Testing scientific code, v13.0</a:t>
+            </a:r>
+          </a:p>
+        </p:txBody>
+      </p:sp>
+      <p:pic>
+        <p:nvPicPr>
+          <p:cNvPr id="6" name="Picture 5">
             <a:extLst>
               <a:ext uri="{FF2B5EF4-FFF2-40B4-BE49-F238E27FC236}">
-                <a16:creationId xmlns:a16="http://schemas.microsoft.com/office/drawing/2014/main" id="{24F65E8D-4D01-C742-9DDA-6A2F203BD5CD}"/>
-              </a:ext>
-            </a:extLst>
-          </p:cNvPr>
-          <p:cNvSpPr>
-            <a:spLocks noGrp="1"/>
-          </p:cNvSpPr>
-          <p:nvPr>
-            <p:ph type="ftr" sz="quarter" idx="11"/>
-          </p:nvPr>
-        </p:nvSpPr>
-        <p:spPr/>
-        <p:txBody>
-          <a:bodyPr/>
-          <a:lstStyle/>
-          <a:p>
-            <a:r>
-              <a:rPr lang="en-US"/>
-              <a:t>Testing scientific code, v13.0</a:t>
-            </a:r>
-          </a:p>
-        </p:txBody>
-      </p:sp>
-      <p:pic>
-        <p:nvPicPr>
-          <p:cNvPr id="5" name="Picture 4">
-            <a:extLst>
-              <a:ext uri="{FF2B5EF4-FFF2-40B4-BE49-F238E27FC236}">
-                <a16:creationId xmlns:a16="http://schemas.microsoft.com/office/drawing/2014/main" id="{2853844A-CD5E-B94A-B624-4F9C4709F7E9}"/>
+                <a16:creationId xmlns:a16="http://schemas.microsoft.com/office/drawing/2014/main" id="{BB85DDDC-7B30-BA44-A6FF-A34111FE42A3}"/>
               </a:ext>
             </a:extLst>
           </p:cNvPr>
@@ -14840,8 +14812,8 @@
         </p:blipFill>
         <p:spPr>
           <a:xfrm>
-            <a:off x="406421" y="1468721"/>
-            <a:ext cx="4710960" cy="3672408"/>
+            <a:off x="185393" y="122502"/>
+            <a:ext cx="5172390" cy="1656184"/>
           </a:xfrm>
           <a:prstGeom prst="rect">
             <a:avLst/>
@@ -14850,10 +14822,10 @@
       </p:pic>
       <p:pic>
         <p:nvPicPr>
-          <p:cNvPr id="6" name="Picture 5">
+          <p:cNvPr id="7" name="Picture 6">
             <a:extLst>
               <a:ext uri="{FF2B5EF4-FFF2-40B4-BE49-F238E27FC236}">
-                <a16:creationId xmlns:a16="http://schemas.microsoft.com/office/drawing/2014/main" id="{81E3463A-0B50-A14C-B5B7-11E35210B01B}"/>
+                <a16:creationId xmlns:a16="http://schemas.microsoft.com/office/drawing/2014/main" id="{07E29ED9-031C-AF47-8EE0-7DFD19A96AC3}"/>
               </a:ext>
             </a:extLst>
           </p:cNvPr>
@@ -14870,20 +14842,125 @@
         </p:blipFill>
         <p:spPr>
           <a:xfrm>
-            <a:off x="5288938" y="1772817"/>
-            <a:ext cx="3566625" cy="2376264"/>
+            <a:off x="5548086" y="548680"/>
+            <a:ext cx="3305074" cy="4941168"/>
           </a:xfrm>
           <a:prstGeom prst="rect">
             <a:avLst/>
           </a:prstGeom>
         </p:spPr>
       </p:pic>
-      <p:sp>
-        <p:nvSpPr>
-          <p:cNvPr id="7" name="Oval Callout 6">
+      <p:grpSp>
+        <p:nvGrpSpPr>
+          <p:cNvPr id="10" name="Group 9">
             <a:extLst>
               <a:ext uri="{FF2B5EF4-FFF2-40B4-BE49-F238E27FC236}">
-                <a16:creationId xmlns:a16="http://schemas.microsoft.com/office/drawing/2014/main" id="{F564880D-283E-9E4B-8BD8-EAECE555298D}"/>
+                <a16:creationId xmlns:a16="http://schemas.microsoft.com/office/drawing/2014/main" id="{FB733FAD-4956-9545-95F0-ACC0533C9E0E}"/>
+              </a:ext>
+            </a:extLst>
+          </p:cNvPr>
+          <p:cNvGrpSpPr/>
+          <p:nvPr/>
+        </p:nvGrpSpPr>
+        <p:grpSpPr>
+          <a:xfrm>
+            <a:off x="176874" y="1838884"/>
+            <a:ext cx="5343218" cy="2303779"/>
+            <a:chOff x="179512" y="2568121"/>
+            <a:chExt cx="6075091" cy="2619333"/>
+          </a:xfrm>
+        </p:grpSpPr>
+        <p:pic>
+          <p:nvPicPr>
+            <p:cNvPr id="8" name="Picture 7">
+              <a:extLst>
+                <a:ext uri="{FF2B5EF4-FFF2-40B4-BE49-F238E27FC236}">
+                  <a16:creationId xmlns:a16="http://schemas.microsoft.com/office/drawing/2014/main" id="{F680F986-9E9D-F44A-99DD-A262CE7A9CAD}"/>
+                </a:ext>
+              </a:extLst>
+            </p:cNvPr>
+            <p:cNvPicPr>
+              <a:picLocks noChangeAspect="1"/>
+            </p:cNvPicPr>
+            <p:nvPr/>
+          </p:nvPicPr>
+          <p:blipFill>
+            <a:blip r:embed="rId4"/>
+            <a:stretch>
+              <a:fillRect/>
+            </a:stretch>
+          </p:blipFill>
+          <p:spPr>
+            <a:xfrm>
+              <a:off x="179512" y="2568121"/>
+              <a:ext cx="6075091" cy="2619333"/>
+            </a:xfrm>
+            <a:prstGeom prst="rect">
+              <a:avLst/>
+            </a:prstGeom>
+          </p:spPr>
+        </p:pic>
+        <p:sp>
+          <p:nvSpPr>
+            <p:cNvPr id="9" name="Rectangle 8">
+              <a:extLst>
+                <a:ext uri="{FF2B5EF4-FFF2-40B4-BE49-F238E27FC236}">
+                  <a16:creationId xmlns:a16="http://schemas.microsoft.com/office/drawing/2014/main" id="{E7626461-8E70-3D40-A89F-D3EE0464ABA9}"/>
+                </a:ext>
+              </a:extLst>
+            </p:cNvPr>
+            <p:cNvSpPr/>
+            <p:nvPr/>
+          </p:nvSpPr>
+          <p:spPr>
+            <a:xfrm>
+              <a:off x="3275856" y="4365104"/>
+              <a:ext cx="2736304" cy="288032"/>
+            </a:xfrm>
+            <a:prstGeom prst="rect">
+              <a:avLst/>
+            </a:prstGeom>
+            <a:solidFill>
+              <a:srgbClr val="FFFF00">
+                <a:alpha val="29804"/>
+              </a:srgbClr>
+            </a:solidFill>
+            <a:ln>
+              <a:noFill/>
+            </a:ln>
+          </p:spPr>
+          <p:style>
+            <a:lnRef idx="2">
+              <a:schemeClr val="accent1">
+                <a:shade val="50000"/>
+              </a:schemeClr>
+            </a:lnRef>
+            <a:fillRef idx="1">
+              <a:schemeClr val="accent1"/>
+            </a:fillRef>
+            <a:effectRef idx="0">
+              <a:schemeClr val="accent1"/>
+            </a:effectRef>
+            <a:fontRef idx="minor">
+              <a:schemeClr val="lt1"/>
+            </a:fontRef>
+          </p:style>
+          <p:txBody>
+            <a:bodyPr rtlCol="0" anchor="ctr"/>
+            <a:lstStyle/>
+            <a:p>
+              <a:pPr algn="ctr"/>
+              <a:endParaRPr lang="en-CH"/>
+            </a:p>
+          </p:txBody>
+        </p:sp>
+      </p:grpSp>
+      <p:sp>
+        <p:nvSpPr>
+          <p:cNvPr id="11" name="Rectangle 10">
+            <a:extLst>
+              <a:ext uri="{FF2B5EF4-FFF2-40B4-BE49-F238E27FC236}">
+                <a16:creationId xmlns:a16="http://schemas.microsoft.com/office/drawing/2014/main" id="{583D7607-0F16-4442-B196-A43CCB571580}"/>
               </a:ext>
             </a:extLst>
           </p:cNvPr>
@@ -14892,92 +14969,38 @@
         </p:nvSpPr>
         <p:spPr>
           <a:xfrm>
-            <a:off x="5580113" y="908720"/>
-            <a:ext cx="3168351" cy="1261061"/>
-          </a:xfrm>
-          <a:prstGeom prst="wedgeEllipseCallout">
-            <a:avLst>
-              <a:gd name="adj1" fmla="val -25087"/>
-              <a:gd name="adj2" fmla="val 85614"/>
-            </a:avLst>
-          </a:prstGeom>
-        </p:spPr>
-        <p:style>
-          <a:lnRef idx="2">
-            <a:schemeClr val="dk1"/>
-          </a:lnRef>
-          <a:fillRef idx="1">
-            <a:schemeClr val="lt1"/>
-          </a:fillRef>
-          <a:effectRef idx="0">
-            <a:schemeClr val="dk1"/>
-          </a:effectRef>
-          <a:fontRef idx="minor">
-            <a:schemeClr val="dk1"/>
-          </a:fontRef>
-        </p:style>
-        <p:txBody>
-          <a:bodyPr rtlCol="0" anchor="ctr"/>
-          <a:lstStyle/>
-          <a:p>
-            <a:pPr algn="ctr"/>
-            <a:r>
-              <a:rPr lang="en-US" sz="1600" dirty="0"/>
-              <a:t>Prof. </a:t>
-            </a:r>
-            <a:r>
-              <a:rPr lang="en-US" sz="1600" dirty="0" err="1"/>
-              <a:t>Falken</a:t>
-            </a:r>
-            <a:r>
-              <a:rPr lang="en-US" sz="1600" dirty="0"/>
-              <a:t>, you did write tests for the “global thermonuclear war” game, right? Right?? </a:t>
-            </a:r>
-          </a:p>
-        </p:txBody>
-      </p:sp>
-      <p:sp>
-        <p:nvSpPr>
-          <p:cNvPr id="8" name="TextBox 7">
-            <a:extLst>
-              <a:ext uri="{FF2B5EF4-FFF2-40B4-BE49-F238E27FC236}">
-                <a16:creationId xmlns:a16="http://schemas.microsoft.com/office/drawing/2014/main" id="{1E794AA7-5177-2C4A-A002-ABD28F88C504}"/>
-              </a:ext>
-            </a:extLst>
-          </p:cNvPr>
-          <p:cNvSpPr txBox="1"/>
-          <p:nvPr/>
-        </p:nvSpPr>
-        <p:spPr>
-          <a:xfrm>
-            <a:off x="2473424" y="5144705"/>
-            <a:ext cx="2664296" cy="307777"/>
+            <a:off x="144420" y="6516999"/>
+            <a:ext cx="8604448" cy="276999"/>
           </a:xfrm>
           <a:prstGeom prst="rect">
             <a:avLst/>
           </a:prstGeom>
-          <a:noFill/>
+          <a:solidFill>
+            <a:schemeClr val="bg1"/>
+          </a:solidFill>
         </p:spPr>
         <p:txBody>
-          <a:bodyPr wrap="square" rtlCol="0">
+          <a:bodyPr wrap="square">
             <a:spAutoFit/>
           </a:bodyPr>
           <a:lstStyle/>
           <a:p>
-            <a:pPr algn="r"/>
-            <a:r>
-              <a:rPr lang="en-US" sz="1400" dirty="0"/>
-              <a:t>January 13, 2018</a:t>
-            </a:r>
+            <a:r>
+              <a:rPr lang="en-CH" sz="1200" dirty="0">
+                <a:hlinkClick r:id="rId5"/>
+              </a:rPr>
+              <a:t>https://www.businessinsider.fr/us/boeing-software-errors-jeopardized-starliner-spaceship-737-max-planes-2020-2</a:t>
+            </a:r>
+            <a:endParaRPr lang="en-CH" sz="1200" dirty="0"/>
           </a:p>
         </p:txBody>
       </p:sp>
       <p:pic>
         <p:nvPicPr>
-          <p:cNvPr id="9" name="Picture 8">
+          <p:cNvPr id="12" name="Picture 11">
             <a:extLst>
               <a:ext uri="{FF2B5EF4-FFF2-40B4-BE49-F238E27FC236}">
-                <a16:creationId xmlns:a16="http://schemas.microsoft.com/office/drawing/2014/main" id="{C560B8F9-36F5-D140-BC76-2B189BF7833D}"/>
+                <a16:creationId xmlns:a16="http://schemas.microsoft.com/office/drawing/2014/main" id="{1A3AE8EA-9E4F-5441-952F-E82D6C09A832}"/>
               </a:ext>
             </a:extLst>
           </p:cNvPr>
@@ -14987,15 +15010,15 @@
           <p:nvPr/>
         </p:nvPicPr>
         <p:blipFill>
-          <a:blip r:embed="rId4"/>
+          <a:blip r:embed="rId6"/>
           <a:stretch>
             <a:fillRect/>
           </a:stretch>
         </p:blipFill>
         <p:spPr>
           <a:xfrm>
-            <a:off x="8244408" y="1710730"/>
-            <a:ext cx="206102" cy="206102"/>
+            <a:off x="205647" y="4453668"/>
+            <a:ext cx="5076056" cy="947447"/>
           </a:xfrm>
           <a:prstGeom prst="rect">
             <a:avLst/>
@@ -15004,46 +15027,76 @@
       </p:pic>
       <p:sp>
         <p:nvSpPr>
-          <p:cNvPr id="10" name="Rectangle 9">
+          <p:cNvPr id="13" name="TextBox 12">
             <a:extLst>
               <a:ext uri="{FF2B5EF4-FFF2-40B4-BE49-F238E27FC236}">
-                <a16:creationId xmlns:a16="http://schemas.microsoft.com/office/drawing/2014/main" id="{82EBE732-C104-4041-9405-46E7DFF64D72}"/>
+                <a16:creationId xmlns:a16="http://schemas.microsoft.com/office/drawing/2014/main" id="{45957B7E-E5F4-304F-A938-6C931C59FA8A}"/>
               </a:ext>
             </a:extLst>
           </p:cNvPr>
-          <p:cNvSpPr/>
+          <p:cNvSpPr txBox="1"/>
           <p:nvPr/>
         </p:nvSpPr>
         <p:spPr>
           <a:xfrm>
-            <a:off x="-36512" y="5384249"/>
-            <a:ext cx="5174232" cy="276999"/>
+            <a:off x="169774" y="4115639"/>
+            <a:ext cx="529410" cy="276999"/>
+          </a:xfrm>
+          <a:prstGeom prst="rect">
+            <a:avLst/>
+          </a:prstGeom>
+          <a:noFill/>
+        </p:spPr>
+        <p:txBody>
+          <a:bodyPr wrap="square" rtlCol="0">
+            <a:spAutoFit/>
+          </a:bodyPr>
+          <a:lstStyle/>
+          <a:p>
+            <a:r>
+              <a:rPr lang="en-CH" sz="1200" dirty="0">
+                <a:latin typeface="Arial" panose="020B0604020202020204" pitchFamily="34" charset="0"/>
+                <a:cs typeface="Arial" panose="020B0604020202020204" pitchFamily="34" charset="0"/>
+              </a:rPr>
+              <a:t>[...]</a:t>
+            </a:r>
+          </a:p>
+        </p:txBody>
+      </p:sp>
+      <p:pic>
+        <p:nvPicPr>
+          <p:cNvPr id="15" name="Picture 14">
+            <a:extLst>
+              <a:ext uri="{FF2B5EF4-FFF2-40B4-BE49-F238E27FC236}">
+                <a16:creationId xmlns:a16="http://schemas.microsoft.com/office/drawing/2014/main" id="{8E62F920-F729-5249-B853-74B0235356F6}"/>
+              </a:ext>
+            </a:extLst>
+          </p:cNvPr>
+          <p:cNvPicPr>
+            <a:picLocks noChangeAspect="1"/>
+          </p:cNvPicPr>
+          <p:nvPr/>
+        </p:nvPicPr>
+        <p:blipFill>
+          <a:blip r:embed="rId7"/>
+          <a:stretch>
+            <a:fillRect/>
+          </a:stretch>
+        </p:blipFill>
+        <p:spPr>
+          <a:xfrm>
+            <a:off x="205647" y="5556458"/>
+            <a:ext cx="7182027" cy="960541"/>
           </a:xfrm>
           <a:prstGeom prst="rect">
             <a:avLst/>
           </a:prstGeom>
         </p:spPr>
-        <p:txBody>
-          <a:bodyPr wrap="square">
-            <a:spAutoFit/>
-          </a:bodyPr>
-          <a:lstStyle/>
-          <a:p>
-            <a:pPr algn="r"/>
-            <a:r>
-              <a:rPr lang="en-US" sz="1200" dirty="0">
-                <a:hlinkClick r:id="rId5"/>
-              </a:rPr>
-              <a:t>https://www.tricentis.com/blog/2018/04/12/software-fail-watch-q1-2018/</a:t>
-            </a:r>
-            <a:endParaRPr lang="en-US" sz="1200" dirty="0"/>
-          </a:p>
-        </p:txBody>
-      </p:sp>
+      </p:pic>
     </p:spTree>
     <p:extLst>
       <p:ext uri="{BB962C8B-B14F-4D97-AF65-F5344CB8AC3E}">
-        <p14:creationId xmlns:p14="http://schemas.microsoft.com/office/powerpoint/2010/main" val="263491925"/>
+        <p14:creationId xmlns:p14="http://schemas.microsoft.com/office/powerpoint/2010/main" val="2235891451"/>
       </p:ext>
     </p:extLst>
   </p:cSld>
@@ -22089,7 +22142,7 @@
         </p:spPr>
         <p:txBody>
           <a:bodyPr anchor="ctr">
-            <a:normAutofit/>
+            <a:normAutofit fontScale="90000"/>
           </a:bodyPr>
           <a:lstStyle/>
           <a:p>

</xml_diff>

<commit_message>
PDF versions of the slides
</commit_message>
<xml_diff>
--- a/testing_part1.pptx
+++ b/testing_part1.pptx
@@ -40,11 +40,11 @@
     <p:sldId id="457" r:id="rId28"/>
     <p:sldId id="458" r:id="rId29"/>
     <p:sldId id="459" r:id="rId30"/>
-    <p:sldId id="342" r:id="rId31"/>
-    <p:sldId id="379" r:id="rId32"/>
-    <p:sldId id="417" r:id="rId33"/>
-    <p:sldId id="288" r:id="rId34"/>
-    <p:sldId id="298" r:id="rId35"/>
+    <p:sldId id="288" r:id="rId31"/>
+    <p:sldId id="298" r:id="rId32"/>
+    <p:sldId id="342" r:id="rId33"/>
+    <p:sldId id="379" r:id="rId34"/>
+    <p:sldId id="417" r:id="rId35"/>
   </p:sldIdLst>
   <p:sldSz cx="9144000" cy="6858000" type="screen4x3"/>
   <p:notesSz cx="6858000" cy="9144000"/>
@@ -207,11 +207,11 @@
             <p14:sldId id="457"/>
             <p14:sldId id="458"/>
             <p14:sldId id="459"/>
+            <p14:sldId id="288"/>
+            <p14:sldId id="298"/>
             <p14:sldId id="342"/>
             <p14:sldId id="379"/>
             <p14:sldId id="417"/>
-            <p14:sldId id="288"/>
-            <p14:sldId id="298"/>
           </p14:sldIdLst>
         </p14:section>
       </p14:sectionLst>
@@ -8785,7 +8785,7 @@
             <a:fld id="{290187F8-FED7-4A8B-A019-4D10C18BCB4A}" type="slidenum">
               <a:rPr lang="en-US"/>
               <a:pPr/>
-              <a:t>30</a:t>
+              <a:t>32</a:t>
             </a:fld>
             <a:endParaRPr lang="en-US"/>
           </a:p>
@@ -8828,6 +8828,11 @@
         </p:txBody>
       </p:sp>
     </p:spTree>
+    <p:extLst>
+      <p:ext uri="{BB962C8B-B14F-4D97-AF65-F5344CB8AC3E}">
+        <p14:creationId xmlns:p14="http://schemas.microsoft.com/office/powerpoint/2010/main" val="2041235093"/>
+      </p:ext>
+    </p:extLst>
   </p:cSld>
   <p:clrMapOvr>
     <a:masterClrMapping/>
@@ -20781,7 +20786,7 @@
             <a:pPr lvl="1"/>
             <a:r>
               <a:rPr lang="en-US" dirty="0"/>
-              <a:t>In the PR description write “Fixes #2” somewhere, this is going to create an automatic link to the issue, and close the issue if the PR is merged</a:t>
+              <a:t>In the PR description write “Fixes #1” somewhere, this is going to create an automatic link to the issue, and close the issue if the PR is merged</a:t>
             </a:r>
           </a:p>
         </p:txBody>
@@ -21124,523 +21129,7 @@
       </p:grpSpPr>
       <p:sp>
         <p:nvSpPr>
-          <p:cNvPr id="18434" name="Rectangle 2"/>
-          <p:cNvSpPr>
-            <a:spLocks noGrp="1" noChangeArrowheads="1"/>
-          </p:cNvSpPr>
-          <p:nvPr>
-            <p:ph type="title"/>
-          </p:nvPr>
-        </p:nvSpPr>
-        <p:spPr/>
-        <p:txBody>
-          <a:bodyPr>
-            <a:normAutofit/>
-          </a:bodyPr>
-          <a:lstStyle/>
-          <a:p>
-            <a:r>
-              <a:rPr lang="en-US" dirty="0" err="1">
-                <a:cs typeface="Courier New" pitchFamily="49" charset="0"/>
-              </a:rPr>
-              <a:t>Testing error control</a:t>
-            </a:r>
-            <a:endParaRPr lang="en-US" dirty="0">
-              <a:cs typeface="Courier New" pitchFamily="49" charset="0"/>
-            </a:endParaRPr>
-          </a:p>
-        </p:txBody>
-      </p:sp>
-      <p:sp>
-        <p:nvSpPr>
-          <p:cNvPr id="2" name="Content Placeholder 1"/>
-          <p:cNvSpPr>
-            <a:spLocks noGrp="1"/>
-          </p:cNvSpPr>
-          <p:nvPr>
-            <p:ph sz="quarter" idx="1"/>
-          </p:nvPr>
-        </p:nvSpPr>
-        <p:spPr>
-          <a:xfrm>
-            <a:off x="467544" y="1219200"/>
-            <a:ext cx="8424936" cy="4937760"/>
-          </a:xfrm>
-        </p:spPr>
-        <p:txBody>
-          <a:bodyPr>
-            <a:normAutofit lnSpcReduction="10000"/>
-          </a:bodyPr>
-          <a:lstStyle/>
-          <a:p>
-            <a:r>
-              <a:rPr lang="en-US" dirty="0">
-                <a:solidFill>
-                  <a:srgbClr val="000000"/>
-                </a:solidFill>
-                <a:ea typeface="ＭＳ Ｐゴシック" pitchFamily="80" charset="-128"/>
-                <a:cs typeface="Courier New" pitchFamily="49" charset="0"/>
-              </a:rPr>
-              <a:t>Check that an exception is raised:</a:t>
-            </a:r>
-            <a:br>
-              <a:rPr lang="en-US" dirty="0">
-                <a:solidFill>
-                  <a:srgbClr val="000000"/>
-                </a:solidFill>
-                <a:ea typeface="ＭＳ Ｐゴシック" pitchFamily="80" charset="-128"/>
-                <a:cs typeface="Courier New" pitchFamily="49" charset="0"/>
-              </a:rPr>
-            </a:br>
-            <a:br>
-              <a:rPr lang="en-US" sz="1000" dirty="0"/>
-            </a:br>
-            <a:r>
-              <a:rPr lang="en-US" sz="2000">
-                <a:solidFill>
-                  <a:srgbClr val="7F007F"/>
-                </a:solidFill>
-                <a:effectLst/>
-                <a:latin typeface="Courier New"/>
-                <a:cs typeface="Courier New"/>
-              </a:rPr>
-              <a:t>from</a:t>
-            </a:r>
-            <a:r>
-              <a:rPr lang="en-US" sz="2000">
-                <a:solidFill>
-                  <a:srgbClr val="000000"/>
-                </a:solidFill>
-                <a:effectLst/>
-                <a:latin typeface="Courier New"/>
-                <a:cs typeface="Courier New"/>
-              </a:rPr>
-              <a:t> py.test </a:t>
-            </a:r>
-            <a:r>
-              <a:rPr lang="en-US" sz="2000">
-                <a:solidFill>
-                  <a:srgbClr val="7F007F"/>
-                </a:solidFill>
-                <a:effectLst/>
-                <a:latin typeface="Courier New"/>
-                <a:cs typeface="Courier New"/>
-              </a:rPr>
-              <a:t>import</a:t>
-            </a:r>
-            <a:r>
-              <a:rPr lang="en-US" sz="2000">
-                <a:solidFill>
-                  <a:srgbClr val="000000"/>
-                </a:solidFill>
-                <a:effectLst/>
-                <a:latin typeface="Courier New"/>
-                <a:cs typeface="Courier New"/>
-              </a:rPr>
-              <a:t> raises</a:t>
-            </a:r>
-            <a:br>
-              <a:rPr lang="en-US" sz="2000">
-                <a:solidFill>
-                  <a:srgbClr val="000000"/>
-                </a:solidFill>
-                <a:effectLst/>
-                <a:latin typeface="Courier New"/>
-                <a:cs typeface="Courier New"/>
-              </a:rPr>
-            </a:br>
-            <a:r>
-              <a:rPr lang="en-US" sz="2000">
-                <a:solidFill>
-                  <a:srgbClr val="7F007F"/>
-                </a:solidFill>
-                <a:effectLst/>
-                <a:latin typeface="Courier New"/>
-                <a:cs typeface="Courier New"/>
-              </a:rPr>
-              <a:t>def</a:t>
-            </a:r>
-            <a:r>
-              <a:rPr lang="en-US" sz="2000">
-                <a:solidFill>
-                  <a:srgbClr val="000000"/>
-                </a:solidFill>
-                <a:effectLst/>
-                <a:latin typeface="Courier New"/>
-                <a:cs typeface="Courier New"/>
-              </a:rPr>
-              <a:t> </a:t>
-            </a:r>
-            <a:r>
-              <a:rPr lang="en-US" sz="2000">
-                <a:solidFill>
-                  <a:srgbClr val="0000FF"/>
-                </a:solidFill>
-                <a:effectLst/>
-                <a:latin typeface="Courier New"/>
-                <a:cs typeface="Courier New"/>
-              </a:rPr>
-              <a:t>test_raises</a:t>
-            </a:r>
-            <a:r>
-              <a:rPr lang="en-US" sz="2000">
-                <a:solidFill>
-                  <a:srgbClr val="000000"/>
-                </a:solidFill>
-                <a:effectLst/>
-                <a:latin typeface="Courier New"/>
-                <a:cs typeface="Courier New"/>
-              </a:rPr>
-              <a:t>():</a:t>
-            </a:r>
-            <a:br>
-              <a:rPr lang="en-US" sz="2000">
-                <a:solidFill>
-                  <a:srgbClr val="000000"/>
-                </a:solidFill>
-                <a:effectLst/>
-                <a:latin typeface="Courier New"/>
-                <a:cs typeface="Courier New"/>
-              </a:rPr>
-            </a:br>
-            <a:r>
-              <a:rPr lang="en-US" sz="2000">
-                <a:solidFill>
-                  <a:srgbClr val="000000"/>
-                </a:solidFill>
-                <a:effectLst/>
-                <a:latin typeface="Courier New"/>
-                <a:cs typeface="Courier New"/>
-              </a:rPr>
-              <a:t>    </a:t>
-            </a:r>
-            <a:r>
-              <a:rPr lang="en-US" sz="2000">
-                <a:solidFill>
-                  <a:srgbClr val="7F007F"/>
-                </a:solidFill>
-                <a:effectLst/>
-                <a:latin typeface="Courier New"/>
-                <a:cs typeface="Courier New"/>
-              </a:rPr>
-              <a:t>with</a:t>
-            </a:r>
-            <a:r>
-              <a:rPr lang="en-US" sz="2000">
-                <a:solidFill>
-                  <a:srgbClr val="000000"/>
-                </a:solidFill>
-                <a:effectLst/>
-                <a:latin typeface="Courier New"/>
-                <a:cs typeface="Courier New"/>
-              </a:rPr>
-              <a:t> raises(SomeException):</a:t>
-            </a:r>
-            <a:br>
-              <a:rPr lang="en-US" sz="2000">
-                <a:solidFill>
-                  <a:srgbClr val="000000"/>
-                </a:solidFill>
-                <a:effectLst/>
-                <a:latin typeface="Courier New"/>
-                <a:cs typeface="Courier New"/>
-              </a:rPr>
-            </a:br>
-            <a:r>
-              <a:rPr lang="en-US" sz="2000">
-                <a:solidFill>
-                  <a:srgbClr val="000000"/>
-                </a:solidFill>
-                <a:effectLst/>
-                <a:latin typeface="Courier New"/>
-                <a:cs typeface="Courier New"/>
-              </a:rPr>
-              <a:t>        do_something()</a:t>
-            </a:r>
-            <a:br>
-              <a:rPr lang="en-US" sz="2000">
-                <a:solidFill>
-                  <a:srgbClr val="000000"/>
-                </a:solidFill>
-                <a:effectLst/>
-                <a:latin typeface="Courier New"/>
-                <a:cs typeface="Courier New"/>
-              </a:rPr>
-            </a:br>
-            <a:r>
-              <a:rPr lang="en-US" sz="2000">
-                <a:solidFill>
-                  <a:srgbClr val="000000"/>
-                </a:solidFill>
-                <a:effectLst/>
-                <a:latin typeface="Courier New"/>
-                <a:cs typeface="Courier New"/>
-              </a:rPr>
-              <a:t>        do_something_else()</a:t>
-            </a:r>
-            <a:br>
-              <a:rPr lang="en-US" sz="2000">
-                <a:solidFill>
-                  <a:srgbClr val="000000"/>
-                </a:solidFill>
-                <a:effectLst/>
-                <a:latin typeface="Courier New"/>
-                <a:cs typeface="Courier New"/>
-              </a:rPr>
-            </a:br>
-            <a:endParaRPr lang="en-US" sz="2000">
-              <a:solidFill>
-                <a:srgbClr val="000000"/>
-              </a:solidFill>
-              <a:effectLst/>
-              <a:latin typeface="Courier New"/>
-              <a:cs typeface="Courier New"/>
-            </a:endParaRPr>
-          </a:p>
-          <a:p>
-            <a:r>
-              <a:rPr lang="en-US" dirty="0">
-                <a:cs typeface="Courier New"/>
-              </a:rPr>
-              <a:t>For example:</a:t>
-            </a:r>
-            <a:br>
-              <a:rPr lang="en-US" dirty="0">
-                <a:cs typeface="Courier New"/>
-              </a:rPr>
-            </a:br>
-            <a:br>
-              <a:rPr lang="en-US" sz="1000" dirty="0">
-                <a:cs typeface="Courier New"/>
-              </a:rPr>
-            </a:br>
-            <a:r>
-              <a:rPr lang="en-US" sz="2000">
-                <a:solidFill>
-                  <a:srgbClr val="7F007F"/>
-                </a:solidFill>
-                <a:latin typeface="Courier New"/>
-                <a:cs typeface="Courier New"/>
-              </a:rPr>
-              <a:t>with</a:t>
-            </a:r>
-            <a:r>
-              <a:rPr lang="en-US" sz="2000">
-                <a:solidFill>
-                  <a:srgbClr val="000000"/>
-                </a:solidFill>
-                <a:latin typeface="Courier New"/>
-                <a:cs typeface="Courier New"/>
-              </a:rPr>
-              <a:t> </a:t>
-            </a:r>
-            <a:r>
-              <a:rPr lang="en-US" sz="2000" dirty="0" err="1">
-                <a:latin typeface="Courier New"/>
-                <a:cs typeface="Courier New"/>
-              </a:rPr>
-              <a:t>raises</a:t>
-            </a:r>
-            <a:r>
-              <a:rPr lang="en-US" sz="2000" dirty="0">
-                <a:latin typeface="Courier New"/>
-                <a:cs typeface="Courier New"/>
-              </a:rPr>
-              <a:t>(</a:t>
-            </a:r>
-            <a:r>
-              <a:rPr lang="en-US" sz="2000" dirty="0" err="1">
-                <a:latin typeface="Courier New"/>
-                <a:cs typeface="Courier New"/>
-              </a:rPr>
-              <a:t>ValueError</a:t>
-            </a:r>
-            <a:r>
-              <a:rPr lang="en-US" sz="2000" dirty="0">
-                <a:latin typeface="Courier New"/>
-                <a:cs typeface="Courier New"/>
-              </a:rPr>
-              <a:t>):</a:t>
-            </a:r>
-            <a:br>
-              <a:rPr lang="en-US" sz="2000" dirty="0">
-                <a:latin typeface="Courier New"/>
-                <a:cs typeface="Courier New"/>
-              </a:rPr>
-            </a:br>
-            <a:r>
-              <a:rPr lang="en-US" sz="2000" dirty="0">
-                <a:latin typeface="Courier New"/>
-                <a:cs typeface="Courier New"/>
-              </a:rPr>
-              <a:t>    </a:t>
-            </a:r>
-            <a:r>
-              <a:rPr lang="en-US" sz="2000">
-                <a:solidFill>
-                  <a:srgbClr val="7F007F"/>
-                </a:solidFill>
-                <a:effectLst/>
-                <a:latin typeface="Courier New"/>
-                <a:cs typeface="Courier New"/>
-              </a:rPr>
-              <a:t>int</a:t>
-            </a:r>
-            <a:r>
-              <a:rPr lang="en-US" sz="2000">
-                <a:solidFill>
-                  <a:srgbClr val="000000"/>
-                </a:solidFill>
-                <a:effectLst/>
-                <a:latin typeface="Courier New"/>
-                <a:cs typeface="Courier New"/>
-              </a:rPr>
-              <a:t>(</a:t>
-            </a:r>
-            <a:r>
-              <a:rPr lang="en-US" sz="2000">
-                <a:solidFill>
-                  <a:srgbClr val="8B2252"/>
-                </a:solidFill>
-                <a:effectLst/>
-                <a:latin typeface="Courier New"/>
-                <a:cs typeface="Courier New"/>
-              </a:rPr>
-              <a:t>'XYZ’</a:t>
-            </a:r>
-            <a:r>
-              <a:rPr lang="en-US" sz="2000">
-                <a:solidFill>
-                  <a:srgbClr val="000000"/>
-                </a:solidFill>
-                <a:effectLst/>
-                <a:latin typeface="Courier New"/>
-                <a:cs typeface="Courier New"/>
-              </a:rPr>
-              <a:t>)</a:t>
-            </a:r>
-            <a:br>
-              <a:rPr lang="en-US" sz="2000">
-                <a:solidFill>
-                  <a:srgbClr val="000000"/>
-                </a:solidFill>
-                <a:effectLst/>
-                <a:latin typeface="Courier New"/>
-                <a:cs typeface="Courier New"/>
-              </a:rPr>
-            </a:br>
-            <a:br>
-              <a:rPr lang="en-US" sz="2000">
-                <a:solidFill>
-                  <a:srgbClr val="000000"/>
-                </a:solidFill>
-                <a:effectLst/>
-                <a:latin typeface="Courier New"/>
-                <a:cs typeface="Courier New"/>
-              </a:rPr>
-            </a:br>
-            <a:r>
-              <a:rPr lang="en-US" dirty="0">
-                <a:latin typeface="+mj-lt"/>
-                <a:cs typeface="Courier New"/>
-              </a:rPr>
-              <a:t>passes, because</a:t>
-            </a:r>
-            <a:br>
-              <a:rPr lang="en-US" dirty="0">
-                <a:latin typeface="+mj-lt"/>
-                <a:cs typeface="Courier New"/>
-              </a:rPr>
-            </a:br>
-            <a:br>
-              <a:rPr lang="en-US" sz="1000" dirty="0">
-                <a:latin typeface="+mj-lt"/>
-                <a:cs typeface="Courier New"/>
-              </a:rPr>
-            </a:br>
-            <a:r>
-              <a:rPr lang="en-US" sz="1800">
-                <a:solidFill>
-                  <a:srgbClr val="7F007F"/>
-                </a:solidFill>
-                <a:latin typeface="Courier New"/>
-                <a:cs typeface="Courier New"/>
-              </a:rPr>
-              <a:t>int</a:t>
-            </a:r>
-            <a:r>
-              <a:rPr lang="en-US" sz="1800">
-                <a:solidFill>
-                  <a:srgbClr val="000000"/>
-                </a:solidFill>
-                <a:latin typeface="Courier New"/>
-                <a:cs typeface="Courier New"/>
-              </a:rPr>
-              <a:t>(</a:t>
-            </a:r>
-            <a:r>
-              <a:rPr lang="en-US" sz="1800">
-                <a:solidFill>
-                  <a:srgbClr val="8B2252"/>
-                </a:solidFill>
-                <a:latin typeface="Courier New"/>
-                <a:cs typeface="Courier New"/>
-              </a:rPr>
-              <a:t>'XYZ’</a:t>
-            </a:r>
-            <a:r>
-              <a:rPr lang="en-US" sz="1800">
-                <a:solidFill>
-                  <a:srgbClr val="000000"/>
-                </a:solidFill>
-                <a:latin typeface="Courier New"/>
-                <a:cs typeface="Courier New"/>
-              </a:rPr>
-              <a:t>)</a:t>
-            </a:r>
-            <a:br>
-              <a:rPr lang="en-US" sz="1800" dirty="0">
-                <a:latin typeface="Courier New"/>
-                <a:cs typeface="Courier New"/>
-              </a:rPr>
-            </a:br>
-            <a:r>
-              <a:rPr lang="en-US" sz="1800" dirty="0" err="1">
-                <a:latin typeface="Courier New"/>
-                <a:cs typeface="Courier New"/>
-              </a:rPr>
-              <a:t>ValueError</a:t>
-            </a:r>
-            <a:r>
-              <a:rPr lang="en-US" sz="1800" dirty="0">
-                <a:latin typeface="Courier New"/>
-                <a:cs typeface="Courier New"/>
-              </a:rPr>
-              <a:t>: invalid literal for </a:t>
-            </a:r>
-            <a:r>
-              <a:rPr lang="en-US" sz="1800" dirty="0" err="1">
-                <a:latin typeface="Courier New"/>
-                <a:cs typeface="Courier New"/>
-              </a:rPr>
-              <a:t>int</a:t>
-            </a:r>
-            <a:r>
-              <a:rPr lang="en-US" sz="1800" dirty="0">
-                <a:latin typeface="Courier New"/>
-                <a:cs typeface="Courier New"/>
-              </a:rPr>
-              <a:t>() with base 10: 'XYZ'</a:t>
-            </a:r>
-          </a:p>
-          <a:p>
-            <a:endParaRPr lang="en-US" sz="3200" dirty="0"/>
-          </a:p>
-        </p:txBody>
-      </p:sp>
-      <p:sp>
-        <p:nvSpPr>
-          <p:cNvPr id="4" name="Date Placeholder 3"/>
+          <p:cNvPr id="3" name="Date Placeholder 2"/>
           <p:cNvSpPr>
             <a:spLocks noGrp="1"/>
           </p:cNvSpPr>
@@ -21663,7 +21152,7 @@
       </p:sp>
       <p:sp>
         <p:nvSpPr>
-          <p:cNvPr id="5" name="Footer Placeholder 4"/>
+          <p:cNvPr id="4" name="Footer Placeholder 3"/>
           <p:cNvSpPr>
             <a:spLocks noGrp="1"/>
           </p:cNvSpPr>
@@ -21683,12 +21172,45 @@
           </a:p>
         </p:txBody>
       </p:sp>
+      <p:sp>
+        <p:nvSpPr>
+          <p:cNvPr id="2" name="Title 1"/>
+          <p:cNvSpPr>
+            <a:spLocks noGrp="1"/>
+          </p:cNvSpPr>
+          <p:nvPr>
+            <p:ph type="title" idx="4294967295"/>
+          </p:nvPr>
+        </p:nvSpPr>
+        <p:spPr>
+          <a:xfrm>
+            <a:off x="460248" y="2705375"/>
+            <a:ext cx="8229600" cy="990600"/>
+          </a:xfrm>
+        </p:spPr>
+        <p:txBody>
+          <a:bodyPr anchor="ctr">
+            <a:normAutofit fontScale="90000"/>
+          </a:bodyPr>
+          <a:lstStyle/>
+          <a:p>
+            <a:pPr algn="ctr"/>
+            <a:r>
+              <a:rPr lang="en-GB" sz="5400" dirty="0"/>
+              <a:t>Up next:</a:t>
+            </a:r>
+            <a:br>
+              <a:rPr lang="en-GB" sz="5400" dirty="0"/>
+            </a:br>
+            <a:r>
+              <a:rPr lang="en-GB" sz="5400"/>
+              <a:t>Testing patterns</a:t>
+            </a:r>
+            <a:endParaRPr lang="en-GB" sz="5400" dirty="0"/>
+          </a:p>
+        </p:txBody>
+      </p:sp>
     </p:spTree>
-    <p:extLst>
-      <p:ext uri="{BB962C8B-B14F-4D97-AF65-F5344CB8AC3E}">
-        <p14:creationId xmlns:p14="http://schemas.microsoft.com/office/powerpoint/2010/main" val="3224856850"/>
-      </p:ext>
-    </p:extLst>
   </p:cSld>
   <p:clrMapOvr>
     <a:masterClrMapping/>
@@ -21715,242 +21237,7 @@
       </p:grpSpPr>
       <p:sp>
         <p:nvSpPr>
-          <p:cNvPr id="2" name="Title 1"/>
-          <p:cNvSpPr>
-            <a:spLocks noGrp="1"/>
-          </p:cNvSpPr>
-          <p:nvPr>
-            <p:ph type="title"/>
-          </p:nvPr>
-        </p:nvSpPr>
-        <p:spPr/>
-        <p:txBody>
-          <a:bodyPr/>
-          <a:lstStyle/>
-          <a:p>
-            <a:r>
-              <a:rPr lang="en-US"/>
-              <a:t>Testing error control</a:t>
-            </a:r>
-          </a:p>
-        </p:txBody>
-      </p:sp>
-      <p:sp>
-        <p:nvSpPr>
-          <p:cNvPr id="3" name="Content Placeholder 2"/>
-          <p:cNvSpPr>
-            <a:spLocks noGrp="1"/>
-          </p:cNvSpPr>
-          <p:nvPr>
-            <p:ph sz="quarter" idx="1"/>
-          </p:nvPr>
-        </p:nvSpPr>
-        <p:spPr/>
-        <p:txBody>
-          <a:bodyPr/>
-          <a:lstStyle/>
-          <a:p>
-            <a:r>
-              <a:rPr lang="en-US" dirty="0"/>
-              <a:t>Use the most specific exception class, or the test may pass because of collateral damage:</a:t>
-            </a:r>
-            <a:br>
-              <a:rPr lang="en-US" dirty="0"/>
-            </a:br>
-            <a:br>
-              <a:rPr lang="en-US" dirty="0"/>
-            </a:br>
-            <a:r>
-              <a:rPr lang="en-US" dirty="0">
-                <a:latin typeface="Courier New"/>
-                <a:cs typeface="Courier New"/>
-              </a:rPr>
-              <a:t>    </a:t>
-            </a:r>
-            <a:r>
-              <a:rPr lang="en-US" sz="2000" dirty="0">
-                <a:latin typeface="Courier New"/>
-                <a:cs typeface="Courier New"/>
-              </a:rPr>
-              <a:t># Test that file "None" cannot be opened.</a:t>
-            </a:r>
-            <a:br>
-              <a:rPr lang="en-US" dirty="0">
-                <a:latin typeface="Courier New"/>
-                <a:cs typeface="Courier New"/>
-              </a:rPr>
-            </a:br>
-            <a:r>
-              <a:rPr lang="en-US" dirty="0">
-                <a:latin typeface="Courier New"/>
-                <a:cs typeface="Courier New"/>
-              </a:rPr>
-              <a:t>    </a:t>
-            </a:r>
-            <a:r>
-              <a:rPr lang="en-US" sz="2000" dirty="0">
-                <a:latin typeface="Courier New"/>
-                <a:cs typeface="Courier New"/>
-              </a:rPr>
-              <a:t>with raises(IOError):</a:t>
-            </a:r>
-            <a:br>
-              <a:rPr lang="en-US" sz="2000" dirty="0">
-                <a:latin typeface="Courier New"/>
-                <a:cs typeface="Courier New"/>
-              </a:rPr>
-            </a:br>
-            <a:r>
-              <a:rPr lang="en-US" sz="2000" dirty="0">
-                <a:latin typeface="Courier New"/>
-                <a:cs typeface="Courier New"/>
-              </a:rPr>
-              <a:t>        open(None, 'r')</a:t>
-            </a:r>
-            <a:br>
-              <a:rPr lang="en-US" sz="2000" dirty="0">
-                <a:latin typeface="Courier New"/>
-                <a:cs typeface="Courier New"/>
-              </a:rPr>
-            </a:br>
-            <a:br>
-              <a:rPr lang="en-US" sz="2000" dirty="0">
-                <a:latin typeface="Courier New"/>
-                <a:cs typeface="Courier New"/>
-              </a:rPr>
-            </a:br>
-            <a:r>
-              <a:rPr lang="en-US" dirty="0">
-                <a:cs typeface="Courier New"/>
-              </a:rPr>
-              <a:t>as expected, but</a:t>
-            </a:r>
-            <a:br>
-              <a:rPr lang="en-US" dirty="0">
-                <a:cs typeface="Courier New"/>
-              </a:rPr>
-            </a:br>
-            <a:br>
-              <a:rPr lang="en-US" dirty="0">
-                <a:cs typeface="Courier New"/>
-              </a:rPr>
-            </a:br>
-            <a:r>
-              <a:rPr lang="en-US" dirty="0">
-                <a:latin typeface="Courier New"/>
-                <a:cs typeface="Courier New"/>
-              </a:rPr>
-              <a:t>    </a:t>
-            </a:r>
-            <a:r>
-              <a:rPr lang="en-US" sz="2000" dirty="0">
-                <a:latin typeface="Courier New"/>
-                <a:cs typeface="Courier New"/>
-              </a:rPr>
-              <a:t>with raises(Exception):</a:t>
-            </a:r>
-            <a:br>
-              <a:rPr lang="en-US" sz="2000" dirty="0">
-                <a:latin typeface="Courier New"/>
-                <a:cs typeface="Courier New"/>
-              </a:rPr>
-            </a:br>
-            <a:r>
-              <a:rPr lang="en-US" sz="2000" dirty="0">
-                <a:latin typeface="Courier New"/>
-                <a:cs typeface="Courier New"/>
-              </a:rPr>
-              <a:t>        open(None, 'r’)</a:t>
-            </a:r>
-            <a:br>
-              <a:rPr lang="en-US" sz="2000" dirty="0">
-                <a:latin typeface="Courier New"/>
-                <a:cs typeface="Courier New"/>
-              </a:rPr>
-            </a:br>
-            <a:endParaRPr lang="en-US" dirty="0">
-              <a:latin typeface="Courier New"/>
-              <a:cs typeface="Courier New"/>
-            </a:endParaRPr>
-          </a:p>
-          <a:p>
-            <a:endParaRPr lang="en-US"/>
-          </a:p>
-        </p:txBody>
-      </p:sp>
-      <p:sp>
-        <p:nvSpPr>
-          <p:cNvPr id="8" name="Rectangle 7"/>
-          <p:cNvSpPr/>
-          <p:nvPr/>
-        </p:nvSpPr>
-        <p:spPr>
-          <a:xfrm>
-            <a:off x="6732240" y="3039343"/>
-            <a:ext cx="1477538" cy="461665"/>
-          </a:xfrm>
-          <a:prstGeom prst="rect">
-            <a:avLst/>
-          </a:prstGeom>
-        </p:spPr>
-        <p:txBody>
-          <a:bodyPr wrap="none">
-            <a:spAutoFit/>
-          </a:bodyPr>
-          <a:lstStyle/>
-          <a:p>
-            <a:r>
-              <a:rPr lang="en-US" dirty="0">
-                <a:solidFill>
-                  <a:srgbClr val="FF0000"/>
-                </a:solidFill>
-                <a:latin typeface="Courier New" pitchFamily="49" charset="0"/>
-                <a:cs typeface="Courier New" pitchFamily="49" charset="0"/>
-              </a:rPr>
-              <a:t>=&gt; fail</a:t>
-            </a:r>
-            <a:endParaRPr lang="en-US"/>
-          </a:p>
-        </p:txBody>
-      </p:sp>
-      <p:sp>
-        <p:nvSpPr>
-          <p:cNvPr id="9" name="Rectangle 8"/>
-          <p:cNvSpPr/>
-          <p:nvPr/>
-        </p:nvSpPr>
-        <p:spPr>
-          <a:xfrm>
-            <a:off x="6732240" y="4221088"/>
-            <a:ext cx="1477538" cy="461665"/>
-          </a:xfrm>
-          <a:prstGeom prst="rect">
-            <a:avLst/>
-          </a:prstGeom>
-        </p:spPr>
-        <p:txBody>
-          <a:bodyPr wrap="none">
-            <a:spAutoFit/>
-          </a:bodyPr>
-          <a:lstStyle/>
-          <a:p>
-            <a:r>
-              <a:rPr lang="en-US" dirty="0">
-                <a:solidFill>
-                  <a:srgbClr val="0ECC00"/>
-                </a:solidFill>
-                <a:latin typeface="Courier New" pitchFamily="49" charset="0"/>
-                <a:cs typeface="Courier New" pitchFamily="49" charset="0"/>
-              </a:rPr>
-              <a:t>=&gt; pass</a:t>
-            </a:r>
-            <a:endParaRPr lang="en-US"/>
-          </a:p>
-        </p:txBody>
-      </p:sp>
-      <p:sp>
-        <p:nvSpPr>
-          <p:cNvPr id="6" name="Date Placeholder 5"/>
+          <p:cNvPr id="2" name="Date Placeholder 1"/>
           <p:cNvSpPr>
             <a:spLocks noGrp="1"/>
           </p:cNvSpPr>
@@ -21973,7 +21260,7 @@
       </p:sp>
       <p:sp>
         <p:nvSpPr>
-          <p:cNvPr id="7" name="Footer Placeholder 6"/>
+          <p:cNvPr id="3" name="Footer Placeholder 2"/>
           <p:cNvSpPr>
             <a:spLocks noGrp="1"/>
           </p:cNvSpPr>
@@ -21994,11 +21281,6 @@
         </p:txBody>
       </p:sp>
     </p:spTree>
-    <p:extLst>
-      <p:ext uri="{BB962C8B-B14F-4D97-AF65-F5344CB8AC3E}">
-        <p14:creationId xmlns:p14="http://schemas.microsoft.com/office/powerpoint/2010/main" val="3821781946"/>
-      </p:ext>
-    </p:extLst>
   </p:cSld>
   <p:clrMapOvr>
     <a:masterClrMapping/>
@@ -22025,9 +21307,9 @@
       </p:grpSpPr>
       <p:sp>
         <p:nvSpPr>
-          <p:cNvPr id="2" name="Title 1"/>
-          <p:cNvSpPr>
-            <a:spLocks noGrp="1"/>
+          <p:cNvPr id="18434" name="Rectangle 2"/>
+          <p:cNvSpPr>
+            <a:spLocks noGrp="1" noChangeArrowheads="1"/>
           </p:cNvSpPr>
           <p:nvPr>
             <p:ph type="title"/>
@@ -22035,19 +21317,26 @@
         </p:nvSpPr>
         <p:spPr/>
         <p:txBody>
-          <a:bodyPr/>
+          <a:bodyPr>
+            <a:normAutofit/>
+          </a:bodyPr>
           <a:lstStyle/>
           <a:p>
             <a:r>
-              <a:rPr lang="en-US"/>
-              <a:t>Hands-on!</a:t>
-            </a:r>
-          </a:p>
-        </p:txBody>
-      </p:sp>
-      <p:sp>
-        <p:nvSpPr>
-          <p:cNvPr id="3" name="Content Placeholder 2"/>
+              <a:rPr lang="en-US" dirty="0" err="1">
+                <a:cs typeface="Courier New" pitchFamily="49" charset="0"/>
+              </a:rPr>
+              <a:t>Testing error control</a:t>
+            </a:r>
+            <a:endParaRPr lang="en-US" dirty="0">
+              <a:cs typeface="Courier New" pitchFamily="49" charset="0"/>
+            </a:endParaRPr>
+          </a:p>
+        </p:txBody>
+      </p:sp>
+      <p:sp>
+        <p:nvSpPr>
+          <p:cNvPr id="2" name="Content Placeholder 1"/>
           <p:cNvSpPr>
             <a:spLocks noGrp="1"/>
           </p:cNvSpPr>
@@ -22055,66 +21344,486 @@
             <p:ph sz="quarter" idx="1"/>
           </p:nvPr>
         </p:nvSpPr>
-        <p:spPr/>
-        <p:txBody>
-          <a:bodyPr/>
+        <p:spPr>
+          <a:xfrm>
+            <a:off x="467544" y="1219200"/>
+            <a:ext cx="8424936" cy="4937760"/>
+          </a:xfrm>
+        </p:spPr>
+        <p:txBody>
+          <a:bodyPr>
+            <a:normAutofit lnSpcReduction="10000"/>
+          </a:bodyPr>
           <a:lstStyle/>
           <a:p>
             <a:r>
-              <a:rPr lang="en-US" dirty="0"/>
-              <a:t>Submit a Pull Request for Issue #2 on GitHub</a:t>
+              <a:rPr lang="en-US" dirty="0">
+                <a:solidFill>
+                  <a:srgbClr val="000000"/>
+                </a:solidFill>
+                <a:ea typeface="ＭＳ Ｐゴシック" pitchFamily="80" charset="-128"/>
+                <a:cs typeface="Courier New" pitchFamily="49" charset="0"/>
+              </a:rPr>
+              <a:t>Check that an exception is raised:</a:t>
             </a:r>
             <a:br>
-              <a:rPr lang="en-US" dirty="0"/>
+              <a:rPr lang="en-US" dirty="0">
+                <a:solidFill>
+                  <a:srgbClr val="000000"/>
+                </a:solidFill>
+                <a:ea typeface="ＭＳ Ｐゴシック" pitchFamily="80" charset="-128"/>
+                <a:cs typeface="Courier New" pitchFamily="49" charset="0"/>
+              </a:rPr>
             </a:br>
-            <a:endParaRPr lang="en-US" dirty="0"/>
-          </a:p>
-          <a:p>
-            <a:pPr lvl="1"/>
-            <a:r>
-              <a:rPr lang="en-US" dirty="0"/>
-              <a:t>Check out the master branch</a:t>
-            </a:r>
-          </a:p>
-          <a:p>
-            <a:pPr lvl="1"/>
-            <a:r>
-              <a:rPr lang="en-US" dirty="0"/>
-              <a:t>Update the master branch with the new commits from upstream</a:t>
-            </a:r>
-          </a:p>
-          <a:p>
-            <a:pPr lvl="1"/>
-            <a:r>
-              <a:rPr lang="en-US" dirty="0"/>
-              <a:t>Create a branch with a new unique name (e.g. testing-pb-007)</a:t>
-            </a:r>
-          </a:p>
-          <a:p>
-            <a:pPr lvl="1"/>
-            <a:r>
-              <a:rPr lang="en-US" dirty="0"/>
-              <a:t>Solve and create a PR as you did before</a:t>
-            </a:r>
-          </a:p>
-          <a:p>
-            <a:pPr lvl="1"/>
-            <a:endParaRPr lang="en-US" dirty="0"/>
-          </a:p>
-          <a:p>
-            <a:endParaRPr lang="en-US" dirty="0"/>
-          </a:p>
-          <a:p>
-            <a:pPr marL="274320" lvl="1" indent="0">
-              <a:buNone/>
-            </a:pPr>
-            <a:endParaRPr lang="en-US" dirty="0"/>
-          </a:p>
-        </p:txBody>
-      </p:sp>
-      <p:sp>
-        <p:nvSpPr>
-          <p:cNvPr id="6" name="Date Placeholder 5"/>
+            <a:br>
+              <a:rPr lang="en-US" sz="1000" dirty="0"/>
+            </a:br>
+            <a:r>
+              <a:rPr lang="en-US" sz="2000">
+                <a:solidFill>
+                  <a:srgbClr val="7F007F"/>
+                </a:solidFill>
+                <a:effectLst/>
+                <a:latin typeface="Courier New"/>
+                <a:cs typeface="Courier New"/>
+              </a:rPr>
+              <a:t>from</a:t>
+            </a:r>
+            <a:r>
+              <a:rPr lang="en-US" sz="2000">
+                <a:solidFill>
+                  <a:srgbClr val="000000"/>
+                </a:solidFill>
+                <a:effectLst/>
+                <a:latin typeface="Courier New"/>
+                <a:cs typeface="Courier New"/>
+              </a:rPr>
+              <a:t> py.test </a:t>
+            </a:r>
+            <a:r>
+              <a:rPr lang="en-US" sz="2000">
+                <a:solidFill>
+                  <a:srgbClr val="7F007F"/>
+                </a:solidFill>
+                <a:effectLst/>
+                <a:latin typeface="Courier New"/>
+                <a:cs typeface="Courier New"/>
+              </a:rPr>
+              <a:t>import</a:t>
+            </a:r>
+            <a:r>
+              <a:rPr lang="en-US" sz="2000">
+                <a:solidFill>
+                  <a:srgbClr val="000000"/>
+                </a:solidFill>
+                <a:effectLst/>
+                <a:latin typeface="Courier New"/>
+                <a:cs typeface="Courier New"/>
+              </a:rPr>
+              <a:t> raises</a:t>
+            </a:r>
+            <a:br>
+              <a:rPr lang="en-US" sz="2000">
+                <a:solidFill>
+                  <a:srgbClr val="000000"/>
+                </a:solidFill>
+                <a:effectLst/>
+                <a:latin typeface="Courier New"/>
+                <a:cs typeface="Courier New"/>
+              </a:rPr>
+            </a:br>
+            <a:r>
+              <a:rPr lang="en-US" sz="2000">
+                <a:solidFill>
+                  <a:srgbClr val="7F007F"/>
+                </a:solidFill>
+                <a:effectLst/>
+                <a:latin typeface="Courier New"/>
+                <a:cs typeface="Courier New"/>
+              </a:rPr>
+              <a:t>def</a:t>
+            </a:r>
+            <a:r>
+              <a:rPr lang="en-US" sz="2000">
+                <a:solidFill>
+                  <a:srgbClr val="000000"/>
+                </a:solidFill>
+                <a:effectLst/>
+                <a:latin typeface="Courier New"/>
+                <a:cs typeface="Courier New"/>
+              </a:rPr>
+              <a:t> </a:t>
+            </a:r>
+            <a:r>
+              <a:rPr lang="en-US" sz="2000">
+                <a:solidFill>
+                  <a:srgbClr val="0000FF"/>
+                </a:solidFill>
+                <a:effectLst/>
+                <a:latin typeface="Courier New"/>
+                <a:cs typeface="Courier New"/>
+              </a:rPr>
+              <a:t>test_raises</a:t>
+            </a:r>
+            <a:r>
+              <a:rPr lang="en-US" sz="2000">
+                <a:solidFill>
+                  <a:srgbClr val="000000"/>
+                </a:solidFill>
+                <a:effectLst/>
+                <a:latin typeface="Courier New"/>
+                <a:cs typeface="Courier New"/>
+              </a:rPr>
+              <a:t>():</a:t>
+            </a:r>
+            <a:br>
+              <a:rPr lang="en-US" sz="2000">
+                <a:solidFill>
+                  <a:srgbClr val="000000"/>
+                </a:solidFill>
+                <a:effectLst/>
+                <a:latin typeface="Courier New"/>
+                <a:cs typeface="Courier New"/>
+              </a:rPr>
+            </a:br>
+            <a:r>
+              <a:rPr lang="en-US" sz="2000">
+                <a:solidFill>
+                  <a:srgbClr val="000000"/>
+                </a:solidFill>
+                <a:effectLst/>
+                <a:latin typeface="Courier New"/>
+                <a:cs typeface="Courier New"/>
+              </a:rPr>
+              <a:t>    </a:t>
+            </a:r>
+            <a:r>
+              <a:rPr lang="en-US" sz="2000">
+                <a:solidFill>
+                  <a:srgbClr val="7F007F"/>
+                </a:solidFill>
+                <a:effectLst/>
+                <a:latin typeface="Courier New"/>
+                <a:cs typeface="Courier New"/>
+              </a:rPr>
+              <a:t>with</a:t>
+            </a:r>
+            <a:r>
+              <a:rPr lang="en-US" sz="2000">
+                <a:solidFill>
+                  <a:srgbClr val="000000"/>
+                </a:solidFill>
+                <a:effectLst/>
+                <a:latin typeface="Courier New"/>
+                <a:cs typeface="Courier New"/>
+              </a:rPr>
+              <a:t> raises(SomeException):</a:t>
+            </a:r>
+            <a:br>
+              <a:rPr lang="en-US" sz="2000">
+                <a:solidFill>
+                  <a:srgbClr val="000000"/>
+                </a:solidFill>
+                <a:effectLst/>
+                <a:latin typeface="Courier New"/>
+                <a:cs typeface="Courier New"/>
+              </a:rPr>
+            </a:br>
+            <a:r>
+              <a:rPr lang="en-US" sz="2000">
+                <a:solidFill>
+                  <a:srgbClr val="000000"/>
+                </a:solidFill>
+                <a:effectLst/>
+                <a:latin typeface="Courier New"/>
+                <a:cs typeface="Courier New"/>
+              </a:rPr>
+              <a:t>        do_something()</a:t>
+            </a:r>
+            <a:br>
+              <a:rPr lang="en-US" sz="2000">
+                <a:solidFill>
+                  <a:srgbClr val="000000"/>
+                </a:solidFill>
+                <a:effectLst/>
+                <a:latin typeface="Courier New"/>
+                <a:cs typeface="Courier New"/>
+              </a:rPr>
+            </a:br>
+            <a:r>
+              <a:rPr lang="en-US" sz="2000">
+                <a:solidFill>
+                  <a:srgbClr val="000000"/>
+                </a:solidFill>
+                <a:effectLst/>
+                <a:latin typeface="Courier New"/>
+                <a:cs typeface="Courier New"/>
+              </a:rPr>
+              <a:t>        do_something_else()</a:t>
+            </a:r>
+            <a:br>
+              <a:rPr lang="en-US" sz="2000">
+                <a:solidFill>
+                  <a:srgbClr val="000000"/>
+                </a:solidFill>
+                <a:effectLst/>
+                <a:latin typeface="Courier New"/>
+                <a:cs typeface="Courier New"/>
+              </a:rPr>
+            </a:br>
+            <a:endParaRPr lang="en-US" sz="2000">
+              <a:solidFill>
+                <a:srgbClr val="000000"/>
+              </a:solidFill>
+              <a:effectLst/>
+              <a:latin typeface="Courier New"/>
+              <a:cs typeface="Courier New"/>
+            </a:endParaRPr>
+          </a:p>
+          <a:p>
+            <a:r>
+              <a:rPr lang="en-US" dirty="0">
+                <a:cs typeface="Courier New"/>
+              </a:rPr>
+              <a:t>For example:</a:t>
+            </a:r>
+            <a:br>
+              <a:rPr lang="en-US" dirty="0">
+                <a:cs typeface="Courier New"/>
+              </a:rPr>
+            </a:br>
+            <a:br>
+              <a:rPr lang="en-US" sz="1000" dirty="0">
+                <a:cs typeface="Courier New"/>
+              </a:rPr>
+            </a:br>
+            <a:r>
+              <a:rPr lang="en-US" sz="2000">
+                <a:solidFill>
+                  <a:srgbClr val="7F007F"/>
+                </a:solidFill>
+                <a:latin typeface="Courier New"/>
+                <a:cs typeface="Courier New"/>
+              </a:rPr>
+              <a:t>with</a:t>
+            </a:r>
+            <a:r>
+              <a:rPr lang="en-US" sz="2000">
+                <a:solidFill>
+                  <a:srgbClr val="000000"/>
+                </a:solidFill>
+                <a:latin typeface="Courier New"/>
+                <a:cs typeface="Courier New"/>
+              </a:rPr>
+              <a:t> </a:t>
+            </a:r>
+            <a:r>
+              <a:rPr lang="en-US" sz="2000" dirty="0" err="1">
+                <a:latin typeface="Courier New"/>
+                <a:cs typeface="Courier New"/>
+              </a:rPr>
+              <a:t>raises</a:t>
+            </a:r>
+            <a:r>
+              <a:rPr lang="en-US" sz="2000" dirty="0">
+                <a:latin typeface="Courier New"/>
+                <a:cs typeface="Courier New"/>
+              </a:rPr>
+              <a:t>(</a:t>
+            </a:r>
+            <a:r>
+              <a:rPr lang="en-US" sz="2000" dirty="0" err="1">
+                <a:latin typeface="Courier New"/>
+                <a:cs typeface="Courier New"/>
+              </a:rPr>
+              <a:t>ValueError</a:t>
+            </a:r>
+            <a:r>
+              <a:rPr lang="en-US" sz="2000" dirty="0">
+                <a:latin typeface="Courier New"/>
+                <a:cs typeface="Courier New"/>
+              </a:rPr>
+              <a:t>):</a:t>
+            </a:r>
+            <a:br>
+              <a:rPr lang="en-US" sz="2000" dirty="0">
+                <a:latin typeface="Courier New"/>
+                <a:cs typeface="Courier New"/>
+              </a:rPr>
+            </a:br>
+            <a:r>
+              <a:rPr lang="en-US" sz="2000" dirty="0">
+                <a:latin typeface="Courier New"/>
+                <a:cs typeface="Courier New"/>
+              </a:rPr>
+              <a:t>    </a:t>
+            </a:r>
+            <a:r>
+              <a:rPr lang="en-US" sz="2000">
+                <a:solidFill>
+                  <a:srgbClr val="7F007F"/>
+                </a:solidFill>
+                <a:effectLst/>
+                <a:latin typeface="Courier New"/>
+                <a:cs typeface="Courier New"/>
+              </a:rPr>
+              <a:t>int</a:t>
+            </a:r>
+            <a:r>
+              <a:rPr lang="en-US" sz="2000">
+                <a:solidFill>
+                  <a:srgbClr val="000000"/>
+                </a:solidFill>
+                <a:effectLst/>
+                <a:latin typeface="Courier New"/>
+                <a:cs typeface="Courier New"/>
+              </a:rPr>
+              <a:t>(</a:t>
+            </a:r>
+            <a:r>
+              <a:rPr lang="en-US" sz="2000">
+                <a:solidFill>
+                  <a:srgbClr val="8B2252"/>
+                </a:solidFill>
+                <a:effectLst/>
+                <a:latin typeface="Courier New"/>
+                <a:cs typeface="Courier New"/>
+              </a:rPr>
+              <a:t>'XYZ’</a:t>
+            </a:r>
+            <a:r>
+              <a:rPr lang="en-US" sz="2000">
+                <a:solidFill>
+                  <a:srgbClr val="000000"/>
+                </a:solidFill>
+                <a:effectLst/>
+                <a:latin typeface="Courier New"/>
+                <a:cs typeface="Courier New"/>
+              </a:rPr>
+              <a:t>)</a:t>
+            </a:r>
+            <a:br>
+              <a:rPr lang="en-US" sz="2000">
+                <a:solidFill>
+                  <a:srgbClr val="000000"/>
+                </a:solidFill>
+                <a:effectLst/>
+                <a:latin typeface="Courier New"/>
+                <a:cs typeface="Courier New"/>
+              </a:rPr>
+            </a:br>
+            <a:br>
+              <a:rPr lang="en-US" sz="2000">
+                <a:solidFill>
+                  <a:srgbClr val="000000"/>
+                </a:solidFill>
+                <a:effectLst/>
+                <a:latin typeface="Courier New"/>
+                <a:cs typeface="Courier New"/>
+              </a:rPr>
+            </a:br>
+            <a:r>
+              <a:rPr lang="en-US" dirty="0">
+                <a:latin typeface="+mj-lt"/>
+                <a:cs typeface="Courier New"/>
+              </a:rPr>
+              <a:t>passes, because</a:t>
+            </a:r>
+            <a:br>
+              <a:rPr lang="en-US" dirty="0">
+                <a:latin typeface="+mj-lt"/>
+                <a:cs typeface="Courier New"/>
+              </a:rPr>
+            </a:br>
+            <a:br>
+              <a:rPr lang="en-US" sz="1000" dirty="0">
+                <a:latin typeface="+mj-lt"/>
+                <a:cs typeface="Courier New"/>
+              </a:rPr>
+            </a:br>
+            <a:r>
+              <a:rPr lang="en-US" sz="1800">
+                <a:solidFill>
+                  <a:srgbClr val="7F007F"/>
+                </a:solidFill>
+                <a:latin typeface="Courier New"/>
+                <a:cs typeface="Courier New"/>
+              </a:rPr>
+              <a:t>int</a:t>
+            </a:r>
+            <a:r>
+              <a:rPr lang="en-US" sz="1800">
+                <a:solidFill>
+                  <a:srgbClr val="000000"/>
+                </a:solidFill>
+                <a:latin typeface="Courier New"/>
+                <a:cs typeface="Courier New"/>
+              </a:rPr>
+              <a:t>(</a:t>
+            </a:r>
+            <a:r>
+              <a:rPr lang="en-US" sz="1800">
+                <a:solidFill>
+                  <a:srgbClr val="8B2252"/>
+                </a:solidFill>
+                <a:latin typeface="Courier New"/>
+                <a:cs typeface="Courier New"/>
+              </a:rPr>
+              <a:t>'XYZ’</a:t>
+            </a:r>
+            <a:r>
+              <a:rPr lang="en-US" sz="1800">
+                <a:solidFill>
+                  <a:srgbClr val="000000"/>
+                </a:solidFill>
+                <a:latin typeface="Courier New"/>
+                <a:cs typeface="Courier New"/>
+              </a:rPr>
+              <a:t>)</a:t>
+            </a:r>
+            <a:br>
+              <a:rPr lang="en-US" sz="1800" dirty="0">
+                <a:latin typeface="Courier New"/>
+                <a:cs typeface="Courier New"/>
+              </a:rPr>
+            </a:br>
+            <a:r>
+              <a:rPr lang="en-US" sz="1800" dirty="0" err="1">
+                <a:latin typeface="Courier New"/>
+                <a:cs typeface="Courier New"/>
+              </a:rPr>
+              <a:t>ValueError</a:t>
+            </a:r>
+            <a:r>
+              <a:rPr lang="en-US" sz="1800" dirty="0">
+                <a:latin typeface="Courier New"/>
+                <a:cs typeface="Courier New"/>
+              </a:rPr>
+              <a:t>: invalid literal for </a:t>
+            </a:r>
+            <a:r>
+              <a:rPr lang="en-US" sz="1800" dirty="0" err="1">
+                <a:latin typeface="Courier New"/>
+                <a:cs typeface="Courier New"/>
+              </a:rPr>
+              <a:t>int</a:t>
+            </a:r>
+            <a:r>
+              <a:rPr lang="en-US" sz="1800" dirty="0">
+                <a:latin typeface="Courier New"/>
+                <a:cs typeface="Courier New"/>
+              </a:rPr>
+              <a:t>() with base 10: 'XYZ'</a:t>
+            </a:r>
+          </a:p>
+          <a:p>
+            <a:endParaRPr lang="en-US" sz="3200" dirty="0"/>
+          </a:p>
+        </p:txBody>
+      </p:sp>
+      <p:sp>
+        <p:nvSpPr>
+          <p:cNvPr id="4" name="Date Placeholder 3"/>
           <p:cNvSpPr>
             <a:spLocks noGrp="1"/>
           </p:cNvSpPr>
@@ -22137,7 +21846,7 @@
       </p:sp>
       <p:sp>
         <p:nvSpPr>
-          <p:cNvPr id="7" name="Footer Placeholder 6"/>
+          <p:cNvPr id="5" name="Footer Placeholder 4"/>
           <p:cNvSpPr>
             <a:spLocks noGrp="1"/>
           </p:cNvSpPr>
@@ -22160,7 +21869,7 @@
     </p:spTree>
     <p:extLst>
       <p:ext uri="{BB962C8B-B14F-4D97-AF65-F5344CB8AC3E}">
-        <p14:creationId xmlns:p14="http://schemas.microsoft.com/office/powerpoint/2010/main" val="3394866785"/>
+        <p14:creationId xmlns:p14="http://schemas.microsoft.com/office/powerpoint/2010/main" val="1848080886"/>
       </p:ext>
     </p:extLst>
   </p:cSld>
@@ -22189,7 +21898,242 @@
       </p:grpSpPr>
       <p:sp>
         <p:nvSpPr>
-          <p:cNvPr id="3" name="Date Placeholder 2"/>
+          <p:cNvPr id="2" name="Title 1"/>
+          <p:cNvSpPr>
+            <a:spLocks noGrp="1"/>
+          </p:cNvSpPr>
+          <p:nvPr>
+            <p:ph type="title"/>
+          </p:nvPr>
+        </p:nvSpPr>
+        <p:spPr/>
+        <p:txBody>
+          <a:bodyPr/>
+          <a:lstStyle/>
+          <a:p>
+            <a:r>
+              <a:rPr lang="en-US"/>
+              <a:t>Testing error control</a:t>
+            </a:r>
+          </a:p>
+        </p:txBody>
+      </p:sp>
+      <p:sp>
+        <p:nvSpPr>
+          <p:cNvPr id="3" name="Content Placeholder 2"/>
+          <p:cNvSpPr>
+            <a:spLocks noGrp="1"/>
+          </p:cNvSpPr>
+          <p:nvPr>
+            <p:ph sz="quarter" idx="1"/>
+          </p:nvPr>
+        </p:nvSpPr>
+        <p:spPr/>
+        <p:txBody>
+          <a:bodyPr/>
+          <a:lstStyle/>
+          <a:p>
+            <a:r>
+              <a:rPr lang="en-US" dirty="0"/>
+              <a:t>Use the most specific exception class, or the test may pass because of collateral damage:</a:t>
+            </a:r>
+            <a:br>
+              <a:rPr lang="en-US" dirty="0"/>
+            </a:br>
+            <a:br>
+              <a:rPr lang="en-US" dirty="0"/>
+            </a:br>
+            <a:r>
+              <a:rPr lang="en-US" dirty="0">
+                <a:latin typeface="Courier New"/>
+                <a:cs typeface="Courier New"/>
+              </a:rPr>
+              <a:t>    </a:t>
+            </a:r>
+            <a:r>
+              <a:rPr lang="en-US" sz="2000" dirty="0">
+                <a:latin typeface="Courier New"/>
+                <a:cs typeface="Courier New"/>
+              </a:rPr>
+              <a:t># Test that file "None" cannot be opened.</a:t>
+            </a:r>
+            <a:br>
+              <a:rPr lang="en-US" dirty="0">
+                <a:latin typeface="Courier New"/>
+                <a:cs typeface="Courier New"/>
+              </a:rPr>
+            </a:br>
+            <a:r>
+              <a:rPr lang="en-US" dirty="0">
+                <a:latin typeface="Courier New"/>
+                <a:cs typeface="Courier New"/>
+              </a:rPr>
+              <a:t>    </a:t>
+            </a:r>
+            <a:r>
+              <a:rPr lang="en-US" sz="2000" dirty="0">
+                <a:latin typeface="Courier New"/>
+                <a:cs typeface="Courier New"/>
+              </a:rPr>
+              <a:t>with raises(IOError):</a:t>
+            </a:r>
+            <a:br>
+              <a:rPr lang="en-US" sz="2000" dirty="0">
+                <a:latin typeface="Courier New"/>
+                <a:cs typeface="Courier New"/>
+              </a:rPr>
+            </a:br>
+            <a:r>
+              <a:rPr lang="en-US" sz="2000" dirty="0">
+                <a:latin typeface="Courier New"/>
+                <a:cs typeface="Courier New"/>
+              </a:rPr>
+              <a:t>        open(None, 'r')</a:t>
+            </a:r>
+            <a:br>
+              <a:rPr lang="en-US" sz="2000" dirty="0">
+                <a:latin typeface="Courier New"/>
+                <a:cs typeface="Courier New"/>
+              </a:rPr>
+            </a:br>
+            <a:br>
+              <a:rPr lang="en-US" sz="2000" dirty="0">
+                <a:latin typeface="Courier New"/>
+                <a:cs typeface="Courier New"/>
+              </a:rPr>
+            </a:br>
+            <a:r>
+              <a:rPr lang="en-US" dirty="0">
+                <a:cs typeface="Courier New"/>
+              </a:rPr>
+              <a:t>as expected, but</a:t>
+            </a:r>
+            <a:br>
+              <a:rPr lang="en-US" dirty="0">
+                <a:cs typeface="Courier New"/>
+              </a:rPr>
+            </a:br>
+            <a:br>
+              <a:rPr lang="en-US" dirty="0">
+                <a:cs typeface="Courier New"/>
+              </a:rPr>
+            </a:br>
+            <a:r>
+              <a:rPr lang="en-US" dirty="0">
+                <a:latin typeface="Courier New"/>
+                <a:cs typeface="Courier New"/>
+              </a:rPr>
+              <a:t>    </a:t>
+            </a:r>
+            <a:r>
+              <a:rPr lang="en-US" sz="2000" dirty="0">
+                <a:latin typeface="Courier New"/>
+                <a:cs typeface="Courier New"/>
+              </a:rPr>
+              <a:t>with raises(Exception):</a:t>
+            </a:r>
+            <a:br>
+              <a:rPr lang="en-US" sz="2000" dirty="0">
+                <a:latin typeface="Courier New"/>
+                <a:cs typeface="Courier New"/>
+              </a:rPr>
+            </a:br>
+            <a:r>
+              <a:rPr lang="en-US" sz="2000" dirty="0">
+                <a:latin typeface="Courier New"/>
+                <a:cs typeface="Courier New"/>
+              </a:rPr>
+              <a:t>        open(None, 'r’)</a:t>
+            </a:r>
+            <a:br>
+              <a:rPr lang="en-US" sz="2000" dirty="0">
+                <a:latin typeface="Courier New"/>
+                <a:cs typeface="Courier New"/>
+              </a:rPr>
+            </a:br>
+            <a:endParaRPr lang="en-US" dirty="0">
+              <a:latin typeface="Courier New"/>
+              <a:cs typeface="Courier New"/>
+            </a:endParaRPr>
+          </a:p>
+          <a:p>
+            <a:endParaRPr lang="en-US"/>
+          </a:p>
+        </p:txBody>
+      </p:sp>
+      <p:sp>
+        <p:nvSpPr>
+          <p:cNvPr id="8" name="Rectangle 7"/>
+          <p:cNvSpPr/>
+          <p:nvPr/>
+        </p:nvSpPr>
+        <p:spPr>
+          <a:xfrm>
+            <a:off x="6732240" y="3039343"/>
+            <a:ext cx="1477538" cy="461665"/>
+          </a:xfrm>
+          <a:prstGeom prst="rect">
+            <a:avLst/>
+          </a:prstGeom>
+        </p:spPr>
+        <p:txBody>
+          <a:bodyPr wrap="none">
+            <a:spAutoFit/>
+          </a:bodyPr>
+          <a:lstStyle/>
+          <a:p>
+            <a:r>
+              <a:rPr lang="en-US" dirty="0">
+                <a:solidFill>
+                  <a:srgbClr val="FF0000"/>
+                </a:solidFill>
+                <a:latin typeface="Courier New" pitchFamily="49" charset="0"/>
+                <a:cs typeface="Courier New" pitchFamily="49" charset="0"/>
+              </a:rPr>
+              <a:t>=&gt; fail</a:t>
+            </a:r>
+            <a:endParaRPr lang="en-US"/>
+          </a:p>
+        </p:txBody>
+      </p:sp>
+      <p:sp>
+        <p:nvSpPr>
+          <p:cNvPr id="9" name="Rectangle 8"/>
+          <p:cNvSpPr/>
+          <p:nvPr/>
+        </p:nvSpPr>
+        <p:spPr>
+          <a:xfrm>
+            <a:off x="6732240" y="4221088"/>
+            <a:ext cx="1477538" cy="461665"/>
+          </a:xfrm>
+          <a:prstGeom prst="rect">
+            <a:avLst/>
+          </a:prstGeom>
+        </p:spPr>
+        <p:txBody>
+          <a:bodyPr wrap="none">
+            <a:spAutoFit/>
+          </a:bodyPr>
+          <a:lstStyle/>
+          <a:p>
+            <a:r>
+              <a:rPr lang="en-US" dirty="0">
+                <a:solidFill>
+                  <a:srgbClr val="0ECC00"/>
+                </a:solidFill>
+                <a:latin typeface="Courier New" pitchFamily="49" charset="0"/>
+                <a:cs typeface="Courier New" pitchFamily="49" charset="0"/>
+              </a:rPr>
+              <a:t>=&gt; pass</a:t>
+            </a:r>
+            <a:endParaRPr lang="en-US"/>
+          </a:p>
+        </p:txBody>
+      </p:sp>
+      <p:sp>
+        <p:nvSpPr>
+          <p:cNvPr id="6" name="Date Placeholder 5"/>
           <p:cNvSpPr>
             <a:spLocks noGrp="1"/>
           </p:cNvSpPr>
@@ -22212,7 +22156,7 @@
       </p:sp>
       <p:sp>
         <p:nvSpPr>
-          <p:cNvPr id="4" name="Footer Placeholder 3"/>
+          <p:cNvPr id="7" name="Footer Placeholder 6"/>
           <p:cNvSpPr>
             <a:spLocks noGrp="1"/>
           </p:cNvSpPr>
@@ -22232,45 +22176,12 @@
           </a:p>
         </p:txBody>
       </p:sp>
-      <p:sp>
-        <p:nvSpPr>
-          <p:cNvPr id="2" name="Title 1"/>
-          <p:cNvSpPr>
-            <a:spLocks noGrp="1"/>
-          </p:cNvSpPr>
-          <p:nvPr>
-            <p:ph type="title" idx="4294967295"/>
-          </p:nvPr>
-        </p:nvSpPr>
-        <p:spPr>
-          <a:xfrm>
-            <a:off x="460248" y="2705375"/>
-            <a:ext cx="8229600" cy="990600"/>
-          </a:xfrm>
-        </p:spPr>
-        <p:txBody>
-          <a:bodyPr anchor="ctr">
-            <a:normAutofit fontScale="90000"/>
-          </a:bodyPr>
-          <a:lstStyle/>
-          <a:p>
-            <a:pPr algn="ctr"/>
-            <a:r>
-              <a:rPr lang="en-GB" sz="5400" dirty="0"/>
-              <a:t>Up next:</a:t>
-            </a:r>
-            <a:br>
-              <a:rPr lang="en-GB" sz="5400" dirty="0"/>
-            </a:br>
-            <a:r>
-              <a:rPr lang="en-GB" sz="5400"/>
-              <a:t>Testing patterns</a:t>
-            </a:r>
-            <a:endParaRPr lang="en-GB" sz="5400" dirty="0"/>
-          </a:p>
-        </p:txBody>
-      </p:sp>
     </p:spTree>
+    <p:extLst>
+      <p:ext uri="{BB962C8B-B14F-4D97-AF65-F5344CB8AC3E}">
+        <p14:creationId xmlns:p14="http://schemas.microsoft.com/office/powerpoint/2010/main" val="1650514965"/>
+      </p:ext>
+    </p:extLst>
   </p:cSld>
   <p:clrMapOvr>
     <a:masterClrMapping/>
@@ -22297,7 +22208,96 @@
       </p:grpSpPr>
       <p:sp>
         <p:nvSpPr>
-          <p:cNvPr id="2" name="Date Placeholder 1"/>
+          <p:cNvPr id="2" name="Title 1"/>
+          <p:cNvSpPr>
+            <a:spLocks noGrp="1"/>
+          </p:cNvSpPr>
+          <p:nvPr>
+            <p:ph type="title"/>
+          </p:nvPr>
+        </p:nvSpPr>
+        <p:spPr/>
+        <p:txBody>
+          <a:bodyPr/>
+          <a:lstStyle/>
+          <a:p>
+            <a:r>
+              <a:rPr lang="en-US"/>
+              <a:t>Hands-on!</a:t>
+            </a:r>
+          </a:p>
+        </p:txBody>
+      </p:sp>
+      <p:sp>
+        <p:nvSpPr>
+          <p:cNvPr id="3" name="Content Placeholder 2"/>
+          <p:cNvSpPr>
+            <a:spLocks noGrp="1"/>
+          </p:cNvSpPr>
+          <p:nvPr>
+            <p:ph sz="quarter" idx="1"/>
+          </p:nvPr>
+        </p:nvSpPr>
+        <p:spPr/>
+        <p:txBody>
+          <a:bodyPr/>
+          <a:lstStyle/>
+          <a:p>
+            <a:r>
+              <a:rPr lang="en-US" dirty="0"/>
+              <a:t>Submit a Pull Request for Issue #2 on GitHub</a:t>
+            </a:r>
+            <a:br>
+              <a:rPr lang="en-US" dirty="0"/>
+            </a:br>
+            <a:endParaRPr lang="en-US" dirty="0"/>
+          </a:p>
+          <a:p>
+            <a:pPr lvl="1"/>
+            <a:r>
+              <a:rPr lang="en-US" dirty="0"/>
+              <a:t>Check out the master branch</a:t>
+            </a:r>
+          </a:p>
+          <a:p>
+            <a:pPr lvl="1"/>
+            <a:r>
+              <a:rPr lang="en-US" dirty="0"/>
+              <a:t>Update the master branch with the new commits from upstream</a:t>
+            </a:r>
+          </a:p>
+          <a:p>
+            <a:pPr lvl="1"/>
+            <a:r>
+              <a:rPr lang="en-US" dirty="0"/>
+              <a:t>Create a branch with a new unique name (e.g. testing-pb-007)</a:t>
+            </a:r>
+          </a:p>
+          <a:p>
+            <a:pPr lvl="1"/>
+            <a:r>
+              <a:rPr lang="en-US" dirty="0"/>
+              <a:t>Solve and create a PR as you did before</a:t>
+            </a:r>
+          </a:p>
+          <a:p>
+            <a:pPr lvl="1"/>
+            <a:endParaRPr lang="en-US" dirty="0"/>
+          </a:p>
+          <a:p>
+            <a:endParaRPr lang="en-US" dirty="0"/>
+          </a:p>
+          <a:p>
+            <a:pPr marL="274320" lvl="1" indent="0">
+              <a:buNone/>
+            </a:pPr>
+            <a:endParaRPr lang="en-US" dirty="0"/>
+          </a:p>
+        </p:txBody>
+      </p:sp>
+      <p:sp>
+        <p:nvSpPr>
+          <p:cNvPr id="6" name="Date Placeholder 5"/>
           <p:cNvSpPr>
             <a:spLocks noGrp="1"/>
           </p:cNvSpPr>
@@ -22320,7 +22320,7 @@
       </p:sp>
       <p:sp>
         <p:nvSpPr>
-          <p:cNvPr id="3" name="Footer Placeholder 2"/>
+          <p:cNvPr id="7" name="Footer Placeholder 6"/>
           <p:cNvSpPr>
             <a:spLocks noGrp="1"/>
           </p:cNvSpPr>
@@ -22341,6 +22341,11 @@
         </p:txBody>
       </p:sp>
     </p:spTree>
+    <p:extLst>
+      <p:ext uri="{BB962C8B-B14F-4D97-AF65-F5344CB8AC3E}">
+        <p14:creationId xmlns:p14="http://schemas.microsoft.com/office/powerpoint/2010/main" val="3130122081"/>
+      </p:ext>
+    </p:extLst>
   </p:cSld>
   <p:clrMapOvr>
     <a:masterClrMapping/>

</xml_diff>

<commit_message>
Update exercise on slides
</commit_message>
<xml_diff>
--- a/testing_part1.pptx
+++ b/testing_part1.pptx
@@ -7309,7 +7309,7 @@
             <a:fld id="{80AC11AF-147E-0A48-A5B0-8DA858D84551}" type="datetimeFigureOut">
               <a:rPr lang="en-US" smtClean="0"/>
               <a:pPr/>
-              <a:t>9/4/22</a:t>
+              <a:t>9/5/22</a:t>
             </a:fld>
             <a:endParaRPr lang="en-US"/>
           </a:p>
@@ -20737,6 +20737,47 @@
         <p:txBody>
           <a:bodyPr/>
           <a:lstStyle/>
+          <a:p>
+            <a:r>
+              <a:rPr lang="en-US" dirty="0">
+                <a:solidFill>
+                  <a:srgbClr val="24292F"/>
+                </a:solidFill>
+              </a:rPr>
+              <a:t>I</a:t>
+            </a:r>
+            <a:r>
+              <a:rPr lang="en-US" b="0" i="0" dirty="0">
+                <a:solidFill>
+                  <a:srgbClr val="24292F"/>
+                </a:solidFill>
+                <a:effectLst/>
+              </a:rPr>
+              <a:t>mplement a working implementation of </a:t>
+            </a:r>
+            <a:r>
+              <a:rPr lang="en-US" b="0" i="0" dirty="0" err="1">
+                <a:solidFill>
+                  <a:srgbClr val="24292F"/>
+                </a:solidFill>
+                <a:effectLst/>
+                <a:latin typeface="Courier New" panose="02070309020205020404" pitchFamily="49" charset="0"/>
+                <a:cs typeface="Courier New" panose="02070309020205020404" pitchFamily="49" charset="0"/>
+              </a:rPr>
+              <a:t>local_maxima</a:t>
+            </a:r>
+            <a:r>
+              <a:rPr lang="en-US" b="0" i="0" dirty="0">
+                <a:solidFill>
+                  <a:srgbClr val="24292F"/>
+                </a:solidFill>
+                <a:effectLst/>
+                <a:latin typeface="Courier New" panose="02070309020205020404" pitchFamily="49" charset="0"/>
+                <a:cs typeface="Courier New" panose="02070309020205020404" pitchFamily="49" charset="0"/>
+              </a:rPr>
+              <a:t> </a:t>
+            </a:r>
+          </a:p>
           <a:p>
             <a:r>
               <a:rPr lang="en-US" dirty="0"/>

</xml_diff>

<commit_message>
Added a local_maxima test that would have made most solutions fail
</commit_message>
<xml_diff>
--- a/testing_part1.pptx
+++ b/testing_part1.pptx
@@ -7309,7 +7309,7 @@
             <a:fld id="{80AC11AF-147E-0A48-A5B0-8DA858D84551}" type="datetimeFigureOut">
               <a:rPr lang="en-US" smtClean="0"/>
               <a:pPr/>
-              <a:t>9/5/22</a:t>
+              <a:t>9/7/22</a:t>
             </a:fld>
             <a:endParaRPr lang="en-US"/>
           </a:p>
@@ -22997,6 +22997,17 @@
               <a:rPr lang="en-US" dirty="0"/>
               <a:t>Input: [1, 2, 2, 1]		Expected result: [1] (or [2], or [1, 2])</a:t>
             </a:r>
+          </a:p>
+          <a:p>
+            <a:pPr lvl="1"/>
+            <a:r>
+              <a:rPr lang="en-US" dirty="0"/>
+              <a:t>Input: [1, 2, 2, 3, 1]		Expected result: [3]</a:t>
+            </a:r>
+          </a:p>
+          <a:p>
+            <a:pPr lvl="1"/>
+            <a:endParaRPr lang="en-US" dirty="0"/>
           </a:p>
           <a:p>
             <a:pPr marL="274320" lvl="1" indent="0">

</xml_diff>

<commit_message>
Update footer for slides: v15, June 2023
</commit_message>
<xml_diff>
--- a/testing_part1.pptx
+++ b/testing_part1.pptx
@@ -7309,7 +7309,7 @@
             <a:fld id="{80AC11AF-147E-0A48-A5B0-8DA858D84551}" type="datetimeFigureOut">
               <a:rPr lang="en-US" smtClean="0"/>
               <a:pPr/>
-              <a:t>9/7/22</a:t>
+              <a:t>6/6/23</a:t>
             </a:fld>
             <a:endParaRPr lang="en-US"/>
           </a:p>
@@ -9937,7 +9937,7 @@
           <a:p>
             <a:r>
               <a:rPr lang="de-CH"/>
-              <a:t>Sept 2022, CC BY-SA 4.0</a:t>
+              <a:t>June 2023, CC BY-SA 4.0</a:t>
             </a:r>
             <a:endParaRPr lang="en-US"/>
           </a:p>
@@ -9960,7 +9960,7 @@
           <a:p>
             <a:r>
               <a:rPr lang="en-US"/>
-              <a:t>Testing scientific code, v14.0</a:t>
+              <a:t>Testing scientific code, v15.0</a:t>
             </a:r>
           </a:p>
         </p:txBody>
@@ -10105,7 +10105,7 @@
           <a:p>
             <a:r>
               <a:rPr lang="de-CH"/>
-              <a:t>Sept 2022, CC BY-SA 4.0</a:t>
+              <a:t>June 2023, CC BY-SA 4.0</a:t>
             </a:r>
             <a:endParaRPr lang="en-US"/>
           </a:p>
@@ -10128,7 +10128,7 @@
           <a:p>
             <a:r>
               <a:rPr lang="en-US"/>
-              <a:t>Testing scientific code, v14.0</a:t>
+              <a:t>Testing scientific code, v15.0</a:t>
             </a:r>
           </a:p>
         </p:txBody>
@@ -10405,7 +10405,7 @@
           <a:p>
             <a:r>
               <a:rPr lang="de-CH"/>
-              <a:t>Sept 2022, CC BY-SA 4.0</a:t>
+              <a:t>June 2023, CC BY-SA 4.0</a:t>
             </a:r>
             <a:endParaRPr lang="en-US"/>
           </a:p>
@@ -10428,7 +10428,7 @@
           <a:p>
             <a:r>
               <a:rPr lang="en-US"/>
-              <a:t>Testing scientific code, v14.0</a:t>
+              <a:t>Testing scientific code, v15.0</a:t>
             </a:r>
           </a:p>
         </p:txBody>
@@ -10595,7 +10595,7 @@
           <a:p>
             <a:r>
               <a:rPr lang="de-CH" sz="1000"/>
-              <a:t>Sept 2022, CC BY-SA 4.0</a:t>
+              <a:t>June 2023, CC BY-SA 4.0</a:t>
             </a:r>
             <a:endParaRPr lang="en-US" sz="1000" dirty="0"/>
           </a:p>
@@ -10622,7 +10622,7 @@
           <a:p>
             <a:r>
               <a:rPr lang="en-US"/>
-              <a:t>Testing scientific code, v14.0</a:t>
+              <a:t>Testing scientific code, v15.0</a:t>
             </a:r>
             <a:endParaRPr lang="en-US" dirty="0"/>
           </a:p>
@@ -10902,7 +10902,7 @@
           <a:p>
             <a:r>
               <a:rPr lang="de-CH"/>
-              <a:t>Sept 2022, CC BY-SA 4.0</a:t>
+              <a:t>June 2023, CC BY-SA 4.0</a:t>
             </a:r>
             <a:endParaRPr lang="en-US"/>
           </a:p>
@@ -10925,7 +10925,7 @@
           <a:p>
             <a:r>
               <a:rPr lang="en-US"/>
-              <a:t>Testing scientific code, v14.0</a:t>
+              <a:t>Testing scientific code, v15.0</a:t>
             </a:r>
           </a:p>
         </p:txBody>
@@ -11137,7 +11137,7 @@
           <a:p>
             <a:r>
               <a:rPr lang="de-CH"/>
-              <a:t>Sept 2022, CC BY-SA 4.0</a:t>
+              <a:t>June 2023, CC BY-SA 4.0</a:t>
             </a:r>
             <a:endParaRPr lang="en-US"/>
           </a:p>
@@ -11160,7 +11160,7 @@
           <a:p>
             <a:r>
               <a:rPr lang="en-US"/>
-              <a:t>Testing scientific code, v14.0</a:t>
+              <a:t>Testing scientific code, v15.0</a:t>
             </a:r>
           </a:p>
         </p:txBody>
@@ -11492,7 +11492,7 @@
           <a:p>
             <a:r>
               <a:rPr lang="de-CH"/>
-              <a:t>Sept 2022, CC BY-SA 4.0</a:t>
+              <a:t>June 2023, CC BY-SA 4.0</a:t>
             </a:r>
             <a:endParaRPr lang="en-US"/>
           </a:p>
@@ -11515,7 +11515,7 @@
           <a:p>
             <a:r>
               <a:rPr lang="en-US"/>
-              <a:t>Testing scientific code, v14.0</a:t>
+              <a:t>Testing scientific code, v15.0</a:t>
             </a:r>
           </a:p>
         </p:txBody>
@@ -11663,7 +11663,7 @@
           <a:p>
             <a:r>
               <a:rPr lang="de-CH"/>
-              <a:t>Sept 2022, CC BY-SA 4.0</a:t>
+              <a:t>June 2023, CC BY-SA 4.0</a:t>
             </a:r>
             <a:endParaRPr lang="en-US"/>
           </a:p>
@@ -11686,7 +11686,7 @@
           <a:p>
             <a:r>
               <a:rPr lang="en-US"/>
-              <a:t>Testing scientific code, v14.0</a:t>
+              <a:t>Testing scientific code, v15.0</a:t>
             </a:r>
           </a:p>
         </p:txBody>
@@ -11843,7 +11843,7 @@
           <a:p>
             <a:r>
               <a:rPr lang="de-CH"/>
-              <a:t>Sept 2022, CC BY-SA 4.0</a:t>
+              <a:t>June 2023, CC BY-SA 4.0</a:t>
             </a:r>
             <a:endParaRPr lang="en-US"/>
           </a:p>
@@ -11866,7 +11866,7 @@
           <a:p>
             <a:r>
               <a:rPr lang="en-US"/>
-              <a:t>Testing scientific code, v14.0</a:t>
+              <a:t>Testing scientific code, v15.0</a:t>
             </a:r>
           </a:p>
         </p:txBody>
@@ -12216,7 +12216,7 @@
           <a:p>
             <a:r>
               <a:rPr lang="de-CH"/>
-              <a:t>Sept 2022, CC BY-SA 4.0</a:t>
+              <a:t>June 2023, CC BY-SA 4.0</a:t>
             </a:r>
             <a:endParaRPr lang="en-US"/>
           </a:p>
@@ -12239,7 +12239,7 @@
           <a:p>
             <a:r>
               <a:rPr lang="en-US"/>
-              <a:t>Testing scientific code, v14.0</a:t>
+              <a:t>Testing scientific code, v15.0</a:t>
             </a:r>
           </a:p>
         </p:txBody>
@@ -12447,7 +12447,7 @@
           <a:p>
             <a:r>
               <a:rPr lang="de-CH"/>
-              <a:t>Sept 2022, CC BY-SA 4.0</a:t>
+              <a:t>June 2023, CC BY-SA 4.0</a:t>
             </a:r>
             <a:endParaRPr lang="en-US"/>
           </a:p>
@@ -12470,7 +12470,7 @@
           <a:p>
             <a:r>
               <a:rPr lang="en-US"/>
-              <a:t>Testing scientific code, v14.0</a:t>
+              <a:t>Testing scientific code, v15.0</a:t>
             </a:r>
           </a:p>
         </p:txBody>
@@ -12787,7 +12787,7 @@
           <a:p>
             <a:r>
               <a:rPr lang="de-CH"/>
-              <a:t>Sept 2022, CC BY-SA 4.0</a:t>
+              <a:t>June 2023, CC BY-SA 4.0</a:t>
             </a:r>
             <a:endParaRPr lang="en-US" dirty="0"/>
           </a:p>
@@ -12826,7 +12826,7 @@
           <a:p>
             <a:r>
               <a:rPr lang="en-US"/>
-              <a:t>Testing scientific code, v14.0</a:t>
+              <a:t>Testing scientific code, v15.0</a:t>
             </a:r>
             <a:endParaRPr lang="en-US" dirty="0"/>
           </a:p>
@@ -13575,7 +13575,7 @@
           <a:p>
             <a:r>
               <a:rPr lang="de-CH"/>
-              <a:t>Sept 2022, CC BY-SA 4.0</a:t>
+              <a:t>June 2023, CC BY-SA 4.0</a:t>
             </a:r>
             <a:endParaRPr lang="en-US"/>
           </a:p>
@@ -13598,7 +13598,7 @@
           <a:p>
             <a:r>
               <a:rPr lang="en-US"/>
-              <a:t>Testing scientific code, v14.0</a:t>
+              <a:t>Testing scientific code, v15.0</a:t>
             </a:r>
           </a:p>
         </p:txBody>
@@ -13748,7 +13748,7 @@
           <a:p>
             <a:r>
               <a:rPr lang="de-CH"/>
-              <a:t>Sept 2022, CC BY-SA 4.0</a:t>
+              <a:t>June 2023, CC BY-SA 4.0</a:t>
             </a:r>
             <a:endParaRPr lang="en-US"/>
           </a:p>
@@ -13771,7 +13771,7 @@
           <a:p>
             <a:r>
               <a:rPr lang="en-US"/>
-              <a:t>Testing scientific code, v14.0</a:t>
+              <a:t>Testing scientific code, v15.0</a:t>
             </a:r>
           </a:p>
         </p:txBody>
@@ -14339,7 +14339,7 @@
           <a:p>
             <a:r>
               <a:rPr lang="de-CH"/>
-              <a:t>Sept 2022, CC BY-SA 4.0</a:t>
+              <a:t>June 2023, CC BY-SA 4.0</a:t>
             </a:r>
             <a:endParaRPr lang="en-US"/>
           </a:p>
@@ -14362,7 +14362,7 @@
           <a:p>
             <a:r>
               <a:rPr lang="en-US"/>
-              <a:t>Testing scientific code, v14.0</a:t>
+              <a:t>Testing scientific code, v15.0</a:t>
             </a:r>
           </a:p>
         </p:txBody>
@@ -14680,7 +14680,7 @@
           <a:p>
             <a:r>
               <a:rPr lang="de-CH"/>
-              <a:t>Sept 2022, CC BY-SA 4.0</a:t>
+              <a:t>June 2023, CC BY-SA 4.0</a:t>
             </a:r>
             <a:endParaRPr lang="en-US"/>
           </a:p>
@@ -14703,7 +14703,7 @@
           <a:p>
             <a:r>
               <a:rPr lang="en-US"/>
-              <a:t>Testing scientific code, v14.0</a:t>
+              <a:t>Testing scientific code, v15.0</a:t>
             </a:r>
           </a:p>
         </p:txBody>
@@ -14761,7 +14761,7 @@
           <a:p>
             <a:r>
               <a:rPr lang="de-CH"/>
-              <a:t>Sept 2022, CC BY-SA 4.0</a:t>
+              <a:t>June 2023, CC BY-SA 4.0</a:t>
             </a:r>
             <a:endParaRPr lang="en-US" dirty="0"/>
           </a:p>
@@ -14790,7 +14790,7 @@
           <a:p>
             <a:r>
               <a:rPr lang="en-US"/>
-              <a:t>Testing scientific code, v14.0</a:t>
+              <a:t>Testing scientific code, v15.0</a:t>
             </a:r>
           </a:p>
         </p:txBody>
@@ -15285,7 +15285,7 @@
           <a:p>
             <a:r>
               <a:rPr lang="de-CH"/>
-              <a:t>Sept 2022, CC BY-SA 4.0</a:t>
+              <a:t>June 2023, CC BY-SA 4.0</a:t>
             </a:r>
             <a:endParaRPr lang="en-US"/>
           </a:p>
@@ -15308,7 +15308,7 @@
           <a:p>
             <a:r>
               <a:rPr lang="en-US"/>
-              <a:t>Testing scientific code, v14.0</a:t>
+              <a:t>Testing scientific code, v15.0</a:t>
             </a:r>
           </a:p>
         </p:txBody>
@@ -15416,7 +15416,7 @@
           <a:p>
             <a:r>
               <a:rPr lang="de-CH"/>
-              <a:t>Sept 2022, CC BY-SA 4.0</a:t>
+              <a:t>June 2023, CC BY-SA 4.0</a:t>
             </a:r>
             <a:endParaRPr lang="en-US"/>
           </a:p>
@@ -15439,7 +15439,7 @@
           <a:p>
             <a:r>
               <a:rPr lang="en-US"/>
-              <a:t>Testing scientific code, v14.0</a:t>
+              <a:t>Testing scientific code, v15.0</a:t>
             </a:r>
           </a:p>
         </p:txBody>
@@ -15604,7 +15604,7 @@
           <a:p>
             <a:r>
               <a:rPr lang="de-CH"/>
-              <a:t>Sept 2022, CC BY-SA 4.0</a:t>
+              <a:t>June 2023, CC BY-SA 4.0</a:t>
             </a:r>
             <a:endParaRPr lang="en-US"/>
           </a:p>
@@ -15627,7 +15627,7 @@
           <a:p>
             <a:r>
               <a:rPr lang="en-US"/>
-              <a:t>Testing scientific code, v14.0</a:t>
+              <a:t>Testing scientific code, v15.0</a:t>
             </a:r>
           </a:p>
         </p:txBody>
@@ -16037,7 +16037,7 @@
           <a:p>
             <a:r>
               <a:rPr lang="de-CH"/>
-              <a:t>Sept 2022, CC BY-SA 4.0</a:t>
+              <a:t>June 2023, CC BY-SA 4.0</a:t>
             </a:r>
             <a:endParaRPr lang="en-US"/>
           </a:p>
@@ -16060,7 +16060,7 @@
           <a:p>
             <a:r>
               <a:rPr lang="en-US"/>
-              <a:t>Testing scientific code, v14.0</a:t>
+              <a:t>Testing scientific code, v15.0</a:t>
             </a:r>
           </a:p>
         </p:txBody>
@@ -16209,7 +16209,7 @@
           <a:p>
             <a:r>
               <a:rPr lang="de-CH"/>
-              <a:t>Sept 2022, CC BY-SA 4.0</a:t>
+              <a:t>June 2023, CC BY-SA 4.0</a:t>
             </a:r>
             <a:endParaRPr lang="en-US"/>
           </a:p>
@@ -16232,7 +16232,7 @@
           <a:p>
             <a:r>
               <a:rPr lang="en-US"/>
-              <a:t>Testing scientific code, v14.0</a:t>
+              <a:t>Testing scientific code, v15.0</a:t>
             </a:r>
           </a:p>
         </p:txBody>
@@ -16805,7 +16805,7 @@
           <a:p>
             <a:r>
               <a:rPr lang="de-CH"/>
-              <a:t>Sept 2022, CC BY-SA 4.0</a:t>
+              <a:t>June 2023, CC BY-SA 4.0</a:t>
             </a:r>
             <a:endParaRPr lang="en-US" dirty="0"/>
           </a:p>
@@ -16828,7 +16828,7 @@
           <a:p>
             <a:r>
               <a:rPr lang="en-US"/>
-              <a:t>Testing scientific code, v14.0</a:t>
+              <a:t>Testing scientific code, v15.0</a:t>
             </a:r>
           </a:p>
         </p:txBody>
@@ -17108,7 +17108,7 @@
           <a:p>
             <a:r>
               <a:rPr lang="de-CH"/>
-              <a:t>Sept 2022, CC BY-SA 4.0</a:t>
+              <a:t>June 2023, CC BY-SA 4.0</a:t>
             </a:r>
             <a:endParaRPr lang="en-US"/>
           </a:p>
@@ -17131,7 +17131,7 @@
           <a:p>
             <a:r>
               <a:rPr lang="en-US"/>
-              <a:t>Testing scientific code, v14.0</a:t>
+              <a:t>Testing scientific code, v15.0</a:t>
             </a:r>
           </a:p>
         </p:txBody>
@@ -17768,7 +17768,7 @@
           <a:p>
             <a:r>
               <a:rPr lang="de-CH"/>
-              <a:t>Sept 2022, CC BY-SA 4.0</a:t>
+              <a:t>June 2023, CC BY-SA 4.0</a:t>
             </a:r>
             <a:endParaRPr lang="en-US"/>
           </a:p>
@@ -17791,7 +17791,7 @@
           <a:p>
             <a:r>
               <a:rPr lang="en-US"/>
-              <a:t>Testing scientific code, v14.0</a:t>
+              <a:t>Testing scientific code, v15.0</a:t>
             </a:r>
           </a:p>
         </p:txBody>
@@ -18313,7 +18313,7 @@
           <a:p>
             <a:r>
               <a:rPr lang="de-CH"/>
-              <a:t>Sept 2022, CC BY-SA 4.0</a:t>
+              <a:t>June 2023, CC BY-SA 4.0</a:t>
             </a:r>
             <a:endParaRPr lang="en-US"/>
           </a:p>
@@ -18336,7 +18336,7 @@
           <a:p>
             <a:r>
               <a:rPr lang="en-US"/>
-              <a:t>Testing scientific code, v14.0</a:t>
+              <a:t>Testing scientific code, v15.0</a:t>
             </a:r>
           </a:p>
         </p:txBody>
@@ -18636,7 +18636,7 @@
           <a:p>
             <a:r>
               <a:rPr lang="de-CH"/>
-              <a:t>Sept 2022, CC BY-SA 4.0</a:t>
+              <a:t>June 2023, CC BY-SA 4.0</a:t>
             </a:r>
             <a:endParaRPr lang="en-US"/>
           </a:p>
@@ -18659,7 +18659,7 @@
           <a:p>
             <a:r>
               <a:rPr lang="en-US"/>
-              <a:t>Testing scientific code, v14.0</a:t>
+              <a:t>Testing scientific code, v15.0</a:t>
             </a:r>
           </a:p>
         </p:txBody>
@@ -18788,7 +18788,7 @@
           <a:p>
             <a:r>
               <a:rPr lang="de-CH"/>
-              <a:t>Sept 2022, CC BY-SA 4.0</a:t>
+              <a:t>June 2023, CC BY-SA 4.0</a:t>
             </a:r>
             <a:endParaRPr lang="en-US"/>
           </a:p>
@@ -18811,7 +18811,7 @@
           <a:p>
             <a:r>
               <a:rPr lang="en-US"/>
-              <a:t>Testing scientific code, v14.0</a:t>
+              <a:t>Testing scientific code, v15.0</a:t>
             </a:r>
           </a:p>
         </p:txBody>
@@ -19364,7 +19364,7 @@
           <a:p>
             <a:r>
               <a:rPr lang="de-CH"/>
-              <a:t>Sept 2022, CC BY-SA 4.0</a:t>
+              <a:t>June 2023, CC BY-SA 4.0</a:t>
             </a:r>
             <a:endParaRPr lang="en-US"/>
           </a:p>
@@ -19387,7 +19387,7 @@
           <a:p>
             <a:r>
               <a:rPr lang="en-US"/>
-              <a:t>Testing scientific code, v14.0</a:t>
+              <a:t>Testing scientific code, v15.0</a:t>
             </a:r>
           </a:p>
         </p:txBody>
@@ -19524,7 +19524,7 @@
           <a:p>
             <a:r>
               <a:rPr lang="de-CH"/>
-              <a:t>Sept 2022, CC BY-SA 4.0</a:t>
+              <a:t>June 2023, CC BY-SA 4.0</a:t>
             </a:r>
             <a:endParaRPr lang="en-US"/>
           </a:p>
@@ -19547,7 +19547,7 @@
           <a:p>
             <a:r>
               <a:rPr lang="en-US"/>
-              <a:t>Testing scientific code, v14.0</a:t>
+              <a:t>Testing scientific code, v15.0</a:t>
             </a:r>
           </a:p>
         </p:txBody>
@@ -20012,7 +20012,7 @@
           <a:p>
             <a:r>
               <a:rPr lang="de-CH"/>
-              <a:t>Sept 2022, CC BY-SA 4.0</a:t>
+              <a:t>June 2023, CC BY-SA 4.0</a:t>
             </a:r>
             <a:endParaRPr lang="en-US"/>
           </a:p>
@@ -20035,7 +20035,7 @@
           <a:p>
             <a:r>
               <a:rPr lang="en-US"/>
-              <a:t>Testing scientific code, v14.0</a:t>
+              <a:t>Testing scientific code, v15.0</a:t>
             </a:r>
           </a:p>
         </p:txBody>
@@ -20461,7 +20461,7 @@
           <a:p>
             <a:r>
               <a:rPr lang="de-CH"/>
-              <a:t>Sept 2022, CC BY-SA 4.0</a:t>
+              <a:t>June 2023, CC BY-SA 4.0</a:t>
             </a:r>
             <a:endParaRPr lang="en-US"/>
           </a:p>
@@ -20484,7 +20484,7 @@
           <a:p>
             <a:r>
               <a:rPr lang="en-US"/>
-              <a:t>Testing scientific code, v14.0</a:t>
+              <a:t>Testing scientific code, v15.0</a:t>
             </a:r>
           </a:p>
         </p:txBody>
@@ -20849,7 +20849,7 @@
           <a:p>
             <a:r>
               <a:rPr lang="de-CH"/>
-              <a:t>Sept 2022, CC BY-SA 4.0</a:t>
+              <a:t>June 2023, CC BY-SA 4.0</a:t>
             </a:r>
             <a:endParaRPr lang="en-US"/>
           </a:p>
@@ -20872,7 +20872,7 @@
           <a:p>
             <a:r>
               <a:rPr lang="en-US"/>
-              <a:t>Testing scientific code, v14.0</a:t>
+              <a:t>Testing scientific code, v15.0</a:t>
             </a:r>
           </a:p>
         </p:txBody>
@@ -21074,7 +21074,7 @@
           <a:p>
             <a:r>
               <a:rPr lang="de-CH"/>
-              <a:t>Sept 2022, CC BY-SA 4.0</a:t>
+              <a:t>June 2023, CC BY-SA 4.0</a:t>
             </a:r>
             <a:endParaRPr lang="en-US" dirty="0"/>
           </a:p>
@@ -21097,7 +21097,7 @@
           <a:p>
             <a:r>
               <a:rPr lang="en-US"/>
-              <a:t>Testing scientific code, v14.0</a:t>
+              <a:t>Testing scientific code, v15.0</a:t>
             </a:r>
           </a:p>
         </p:txBody>
@@ -21185,7 +21185,7 @@
           <a:p>
             <a:r>
               <a:rPr lang="de-CH"/>
-              <a:t>Sept 2022, CC BY-SA 4.0</a:t>
+              <a:t>June 2023, CC BY-SA 4.0</a:t>
             </a:r>
             <a:endParaRPr lang="en-US"/>
           </a:p>
@@ -21208,7 +21208,7 @@
           <a:p>
             <a:r>
               <a:rPr lang="en-US"/>
-              <a:t>Testing scientific code, v14.0</a:t>
+              <a:t>Testing scientific code, v15.0</a:t>
             </a:r>
           </a:p>
         </p:txBody>
@@ -21293,7 +21293,7 @@
           <a:p>
             <a:r>
               <a:rPr lang="de-CH"/>
-              <a:t>Sept 2022, CC BY-SA 4.0</a:t>
+              <a:t>June 2023, CC BY-SA 4.0</a:t>
             </a:r>
             <a:endParaRPr lang="en-US"/>
           </a:p>
@@ -21316,7 +21316,7 @@
           <a:p>
             <a:r>
               <a:rPr lang="en-US"/>
-              <a:t>Testing scientific code, v14.0</a:t>
+              <a:t>Testing scientific code, v15.0</a:t>
             </a:r>
           </a:p>
         </p:txBody>
@@ -21879,7 +21879,7 @@
           <a:p>
             <a:r>
               <a:rPr lang="de-CH"/>
-              <a:t>Sept 2022, CC BY-SA 4.0</a:t>
+              <a:t>June 2023, CC BY-SA 4.0</a:t>
             </a:r>
             <a:endParaRPr lang="en-US"/>
           </a:p>
@@ -21902,7 +21902,7 @@
           <a:p>
             <a:r>
               <a:rPr lang="en-US"/>
-              <a:t>Testing scientific code, v14.0</a:t>
+              <a:t>Testing scientific code, v15.0</a:t>
             </a:r>
           </a:p>
         </p:txBody>
@@ -22189,7 +22189,7 @@
           <a:p>
             <a:r>
               <a:rPr lang="de-CH"/>
-              <a:t>Sept 2022, CC BY-SA 4.0</a:t>
+              <a:t>June 2023, CC BY-SA 4.0</a:t>
             </a:r>
             <a:endParaRPr lang="en-US"/>
           </a:p>
@@ -22212,7 +22212,7 @@
           <a:p>
             <a:r>
               <a:rPr lang="en-US"/>
-              <a:t>Testing scientific code, v14.0</a:t>
+              <a:t>Testing scientific code, v15.0</a:t>
             </a:r>
           </a:p>
         </p:txBody>
@@ -22353,7 +22353,7 @@
           <a:p>
             <a:r>
               <a:rPr lang="de-CH"/>
-              <a:t>Sept 2022, CC BY-SA 4.0</a:t>
+              <a:t>June 2023, CC BY-SA 4.0</a:t>
             </a:r>
             <a:endParaRPr lang="en-US"/>
           </a:p>
@@ -22376,7 +22376,7 @@
           <a:p>
             <a:r>
               <a:rPr lang="en-US"/>
-              <a:t>Testing scientific code, v14.0</a:t>
+              <a:t>Testing scientific code, v15.0</a:t>
             </a:r>
           </a:p>
         </p:txBody>
@@ -22490,7 +22490,7 @@
           <a:p>
             <a:r>
               <a:rPr lang="de-CH"/>
-              <a:t>Sept 2022, CC BY-SA 4.0</a:t>
+              <a:t>June 2023, CC BY-SA 4.0</a:t>
             </a:r>
             <a:endParaRPr lang="en-US"/>
           </a:p>
@@ -22513,7 +22513,7 @@
           <a:p>
             <a:r>
               <a:rPr lang="en-US"/>
-              <a:t>Testing scientific code, v14.0</a:t>
+              <a:t>Testing scientific code, v15.0</a:t>
             </a:r>
           </a:p>
         </p:txBody>
@@ -22727,7 +22727,7 @@
           <a:p>
             <a:r>
               <a:rPr lang="de-CH"/>
-              <a:t>Sept 2022, CC BY-SA 4.0</a:t>
+              <a:t>June 2023, CC BY-SA 4.0</a:t>
             </a:r>
             <a:endParaRPr lang="en-US" dirty="0"/>
           </a:p>
@@ -22750,7 +22750,7 @@
           <a:p>
             <a:r>
               <a:rPr lang="en-US"/>
-              <a:t>Testing scientific code, v14.0</a:t>
+              <a:t>Testing scientific code, v15.0</a:t>
             </a:r>
           </a:p>
         </p:txBody>
@@ -23056,7 +23056,7 @@
           <a:p>
             <a:r>
               <a:rPr lang="de-CH"/>
-              <a:t>Sept 2022, CC BY-SA 4.0</a:t>
+              <a:t>June 2023, CC BY-SA 4.0</a:t>
             </a:r>
             <a:endParaRPr lang="en-US"/>
           </a:p>
@@ -23079,7 +23079,7 @@
           <a:p>
             <a:r>
               <a:rPr lang="en-US"/>
-              <a:t>Testing scientific code, v14.0</a:t>
+              <a:t>Testing scientific code, v15.0</a:t>
             </a:r>
           </a:p>
         </p:txBody>
@@ -23163,7 +23163,7 @@
           <a:p>
             <a:r>
               <a:rPr lang="de-CH"/>
-              <a:t>Sept 2022, CC BY-SA 4.0</a:t>
+              <a:t>June 2023, CC BY-SA 4.0</a:t>
             </a:r>
             <a:endParaRPr lang="en-US"/>
           </a:p>
@@ -23186,7 +23186,7 @@
           <a:p>
             <a:r>
               <a:rPr lang="en-US"/>
-              <a:t>Testing scientific code, v14.0</a:t>
+              <a:t>Testing scientific code, v15.0</a:t>
             </a:r>
           </a:p>
         </p:txBody>
@@ -23414,7 +23414,7 @@
           <a:p>
             <a:r>
               <a:rPr lang="de-CH"/>
-              <a:t>Sept 2022, CC BY-SA 4.0</a:t>
+              <a:t>June 2023, CC BY-SA 4.0</a:t>
             </a:r>
             <a:endParaRPr lang="en-US"/>
           </a:p>
@@ -23437,7 +23437,7 @@
           <a:p>
             <a:r>
               <a:rPr lang="en-US"/>
-              <a:t>Testing scientific code, v14.0</a:t>
+              <a:t>Testing scientific code, v15.0</a:t>
             </a:r>
           </a:p>
         </p:txBody>
@@ -23795,7 +23795,7 @@
           <a:p>
             <a:r>
               <a:rPr lang="de-CH"/>
-              <a:t>Sept 2022, CC BY-SA 4.0</a:t>
+              <a:t>June 2023, CC BY-SA 4.0</a:t>
             </a:r>
             <a:endParaRPr lang="en-US"/>
           </a:p>
@@ -23818,7 +23818,7 @@
           <a:p>
             <a:r>
               <a:rPr lang="en-US"/>
-              <a:t>Testing scientific code, v14.0</a:t>
+              <a:t>Testing scientific code, v15.0</a:t>
             </a:r>
           </a:p>
         </p:txBody>

</xml_diff>

<commit_message>
Getting ready for LatAm
</commit_message>
<xml_diff>
--- a/testing_part1.pptx
+++ b/testing_part1.pptx
@@ -15381,21 +15381,17 @@
           <a:lstStyle/>
           <a:p>
             <a:r>
-              <a:rPr lang="en-US"/>
+              <a:rPr lang="en-US" dirty="0" err="1"/>
               <a:t>unittest</a:t>
             </a:r>
-          </a:p>
-          <a:p>
-            <a:r>
-              <a:rPr lang="en-US"/>
-              <a:t>nosetests</a:t>
-            </a:r>
-          </a:p>
-          <a:p>
-            <a:r>
-              <a:rPr lang="en-US" b="1"/>
-              <a:t>py.test</a:t>
-            </a:r>
+            <a:endParaRPr lang="en-US" dirty="0"/>
+          </a:p>
+          <a:p>
+            <a:r>
+              <a:rPr lang="en-US" b="1" dirty="0" err="1"/>
+              <a:t>pytest</a:t>
+            </a:r>
+            <a:endParaRPr lang="en-US" b="1" dirty="0"/>
           </a:p>
         </p:txBody>
       </p:sp>
@@ -23523,7 +23519,7 @@
                 <a:latin typeface="Courier New" pitchFamily="49" charset="0"/>
                 <a:cs typeface="Courier New" pitchFamily="49" charset="0"/>
               </a:rPr>
-              <a:t>py.test</a:t>
+              <a:t>pytest</a:t>
             </a:r>
             <a:endParaRPr lang="en-US" sz="2100" dirty="0">
               <a:latin typeface="Courier New" pitchFamily="49" charset="0"/>

</xml_diff>

<commit_message>
NumPy to numpy in the slides
</commit_message>
<xml_diff>
--- a/testing_part1.pptx
+++ b/testing_part1.pptx
@@ -7309,7 +7309,7 @@
             <a:fld id="{80AC11AF-147E-0A48-A5B0-8DA858D84551}" type="datetimeFigureOut">
               <a:rPr lang="en-US" smtClean="0"/>
               <a:pPr/>
-              <a:t>6/6/23</a:t>
+              <a:t>6/26/23</a:t>
             </a:fld>
             <a:endParaRPr lang="en-US"/>
           </a:p>
@@ -19600,12 +19600,12 @@
               <a:t>Testing with </a:t>
             </a:r>
             <a:r>
-              <a:rPr lang="en-US" dirty="0" err="1"/>
-              <a:t>NumPy </a:t>
+              <a:rPr lang="en-US"/>
+              <a:t>numpy</a:t>
             </a:r>
             <a:r>
               <a:rPr lang="en-US" dirty="0"/>
-              <a:t>arrays</a:t>
+              <a:t> arrays</a:t>
             </a:r>
           </a:p>
         </p:txBody>

</xml_diff>